<commit_message>
tweaking some priors and ppt stuff
</commit_message>
<xml_diff>
--- a/reports/Design_presentation.pptx
+++ b/reports/Design_presentation.pptx
@@ -25,8 +25,8 @@
     <p:sldId id="277" r:id="rId16"/>
     <p:sldId id="276" r:id="rId17"/>
     <p:sldId id="259" r:id="rId18"/>
-    <p:sldId id="285" r:id="rId19"/>
-    <p:sldId id="284" r:id="rId20"/>
+    <p:sldId id="284" r:id="rId19"/>
+    <p:sldId id="285" r:id="rId20"/>
   </p:sldIdLst>
   <p:sldSz cx="12192000" cy="6858000"/>
   <p:notesSz cx="6858000" cy="9144000"/>
@@ -5151,25 +5151,11 @@
               <a:t> </a:t>
             </a:r>
             <a:r>
-              <a:rPr lang="en-US" sz="1400" dirty="0">
-                <a:latin typeface="Arial" panose="020B0604020202020204" pitchFamily="34" charset="0"/>
-                <a:cs typeface="Arial" panose="020B0604020202020204" pitchFamily="34" charset="0"/>
-              </a:rPr>
-              <a:t>will be repeatedly sampled from one of 5 experiments </a:t>
-            </a:r>
-            <a:r>
               <a:rPr lang="en-US" sz="1400" dirty="0" smtClean="0">
                 <a:latin typeface="Arial" panose="020B0604020202020204" pitchFamily="34" charset="0"/>
                 <a:cs typeface="Arial" panose="020B0604020202020204" pitchFamily="34" charset="0"/>
               </a:rPr>
-              <a:t>in which responders differed in the offers they </a:t>
-            </a:r>
-            <a:r>
-              <a:rPr lang="en-US" sz="1400" dirty="0" smtClean="0">
-                <a:latin typeface="Arial" panose="020B0604020202020204" pitchFamily="34" charset="0"/>
-                <a:cs typeface="Arial" panose="020B0604020202020204" pitchFamily="34" charset="0"/>
-              </a:rPr>
-              <a:t>were willing to accept.</a:t>
+              <a:t>is represented by different symbols</a:t>
             </a:r>
             <a:endParaRPr lang="en-US" sz="1400" dirty="0" smtClean="0">
               <a:latin typeface="Arial" panose="020B0604020202020204" pitchFamily="34" charset="0"/>
@@ -7988,6 +7974,238 @@
           </p:txBody>
         </p:sp>
       </p:grpSp>
+      <p:grpSp>
+        <p:nvGrpSpPr>
+          <p:cNvPr id="80" name="Group 79"/>
+          <p:cNvGrpSpPr/>
+          <p:nvPr/>
+        </p:nvGrpSpPr>
+        <p:grpSpPr>
+          <a:xfrm>
+            <a:off x="8263976" y="4901610"/>
+            <a:ext cx="2287866" cy="1151612"/>
+            <a:chOff x="7117560" y="4792426"/>
+            <a:chExt cx="2287866" cy="1151612"/>
+          </a:xfrm>
+        </p:grpSpPr>
+        <p:sp>
+          <p:nvSpPr>
+            <p:cNvPr id="81" name="Rectangle 80"/>
+            <p:cNvSpPr/>
+            <p:nvPr/>
+          </p:nvSpPr>
+          <p:spPr>
+            <a:xfrm>
+              <a:off x="7117560" y="4792426"/>
+              <a:ext cx="2287866" cy="1151612"/>
+            </a:xfrm>
+            <a:prstGeom prst="rect">
+              <a:avLst/>
+            </a:prstGeom>
+            <a:solidFill>
+              <a:schemeClr val="bg1"/>
+            </a:solidFill>
+            <a:ln>
+              <a:solidFill>
+                <a:schemeClr val="tx1"/>
+              </a:solidFill>
+            </a:ln>
+          </p:spPr>
+          <p:style>
+            <a:lnRef idx="2">
+              <a:schemeClr val="accent1">
+                <a:shade val="50000"/>
+              </a:schemeClr>
+            </a:lnRef>
+            <a:fillRef idx="1">
+              <a:schemeClr val="accent1"/>
+            </a:fillRef>
+            <a:effectRef idx="0">
+              <a:schemeClr val="accent1"/>
+            </a:effectRef>
+            <a:fontRef idx="minor">
+              <a:schemeClr val="lt1"/>
+            </a:fontRef>
+          </p:style>
+          <p:txBody>
+            <a:bodyPr rtlCol="0" anchor="ctr"/>
+            <a:lstStyle/>
+            <a:p>
+              <a:pPr algn="ctr"/>
+              <a:endParaRPr lang="en-US"/>
+            </a:p>
+          </p:txBody>
+        </p:sp>
+        <p:sp>
+          <p:nvSpPr>
+            <p:cNvPr id="82" name="TextBox 81"/>
+            <p:cNvSpPr txBox="1"/>
+            <p:nvPr/>
+          </p:nvSpPr>
+          <p:spPr>
+            <a:xfrm>
+              <a:off x="7522252" y="5006920"/>
+              <a:ext cx="1478481" cy="830997"/>
+            </a:xfrm>
+            <a:prstGeom prst="rect">
+              <a:avLst/>
+            </a:prstGeom>
+            <a:noFill/>
+          </p:spPr>
+          <p:txBody>
+            <a:bodyPr wrap="square" rtlCol="0">
+              <a:spAutoFit/>
+            </a:bodyPr>
+            <a:lstStyle/>
+            <a:p>
+              <a:pPr algn="ctr"/>
+              <a:endParaRPr lang="en-US" sz="1200" dirty="0" smtClean="0">
+                <a:latin typeface="Arial" panose="020B0604020202020204" pitchFamily="34" charset="0"/>
+                <a:cs typeface="Arial" panose="020B0604020202020204" pitchFamily="34" charset="0"/>
+              </a:endParaRPr>
+            </a:p>
+            <a:p>
+              <a:pPr algn="ctr"/>
+              <a:r>
+                <a:rPr lang="en-US" sz="1200" dirty="0" smtClean="0">
+                  <a:latin typeface="Arial" panose="020B0604020202020204" pitchFamily="34" charset="0"/>
+                  <a:cs typeface="Arial" panose="020B0604020202020204" pitchFamily="34" charset="0"/>
+                </a:rPr>
+                <a:t>You = €7</a:t>
+              </a:r>
+            </a:p>
+            <a:p>
+              <a:pPr algn="ctr"/>
+              <a:r>
+                <a:rPr lang="en-US" sz="1200" dirty="0" smtClean="0">
+                  <a:latin typeface="Arial" panose="020B0604020202020204" pitchFamily="34" charset="0"/>
+                  <a:cs typeface="Arial" panose="020B0604020202020204" pitchFamily="34" charset="0"/>
+                </a:rPr>
+                <a:t> </a:t>
+              </a:r>
+              <a:endParaRPr lang="en-US" sz="1200" dirty="0">
+                <a:latin typeface="Arial" panose="020B0604020202020204" pitchFamily="34" charset="0"/>
+                <a:cs typeface="Arial" panose="020B0604020202020204" pitchFamily="34" charset="0"/>
+              </a:endParaRPr>
+            </a:p>
+            <a:p>
+              <a:pPr algn="ctr"/>
+              <a:r>
+                <a:rPr lang="en-US" sz="1200" dirty="0">
+                  <a:latin typeface="Arial" panose="020B0604020202020204" pitchFamily="34" charset="0"/>
+                  <a:cs typeface="Arial" panose="020B0604020202020204" pitchFamily="34" charset="0"/>
+                </a:rPr>
+                <a:t> </a:t>
+              </a:r>
+              <a:r>
+                <a:rPr lang="en-US" sz="1200" dirty="0" smtClean="0">
+                  <a:latin typeface="Arial" panose="020B0604020202020204" pitchFamily="34" charset="0"/>
+                  <a:cs typeface="Arial" panose="020B0604020202020204" pitchFamily="34" charset="0"/>
+                </a:rPr>
+                <a:t>        </a:t>
+              </a:r>
+              <a:r>
+                <a:rPr lang="en-US" sz="1200" dirty="0" smtClean="0">
+                  <a:latin typeface="Arial" panose="020B0604020202020204" pitchFamily="34" charset="0"/>
+                  <a:cs typeface="Arial" panose="020B0604020202020204" pitchFamily="34" charset="0"/>
+                </a:rPr>
+                <a:t>= €13</a:t>
+              </a:r>
+              <a:endParaRPr lang="en-US" sz="1200" dirty="0">
+                <a:latin typeface="Arial" panose="020B0604020202020204" pitchFamily="34" charset="0"/>
+                <a:cs typeface="Arial" panose="020B0604020202020204" pitchFamily="34" charset="0"/>
+              </a:endParaRPr>
+            </a:p>
+          </p:txBody>
+        </p:sp>
+      </p:grpSp>
+      <p:sp>
+        <p:nvSpPr>
+          <p:cNvPr id="83" name="Rectangle 82"/>
+          <p:cNvSpPr/>
+          <p:nvPr/>
+        </p:nvSpPr>
+        <p:spPr>
+          <a:xfrm>
+            <a:off x="9080974" y="5676699"/>
+            <a:ext cx="292100" cy="215642"/>
+          </a:xfrm>
+          <a:prstGeom prst="rect">
+            <a:avLst/>
+          </a:prstGeom>
+          <a:solidFill>
+            <a:schemeClr val="tx1"/>
+          </a:solidFill>
+          <a:ln>
+            <a:solidFill>
+              <a:schemeClr val="tx1"/>
+            </a:solidFill>
+          </a:ln>
+        </p:spPr>
+        <p:style>
+          <a:lnRef idx="2">
+            <a:schemeClr val="accent1">
+              <a:shade val="50000"/>
+            </a:schemeClr>
+          </a:lnRef>
+          <a:fillRef idx="1">
+            <a:schemeClr val="accent1"/>
+          </a:fillRef>
+          <a:effectRef idx="0">
+            <a:schemeClr val="accent1"/>
+          </a:effectRef>
+          <a:fontRef idx="minor">
+            <a:schemeClr val="lt1"/>
+          </a:fontRef>
+        </p:style>
+        <p:txBody>
+          <a:bodyPr rtlCol="0" anchor="ctr"/>
+          <a:lstStyle/>
+          <a:p>
+            <a:pPr algn="ctr"/>
+            <a:endParaRPr lang="en-US"/>
+          </a:p>
+        </p:txBody>
+      </p:sp>
+      <p:sp>
+        <p:nvSpPr>
+          <p:cNvPr id="84" name="TextBox 83"/>
+          <p:cNvSpPr txBox="1"/>
+          <p:nvPr/>
+        </p:nvSpPr>
+        <p:spPr>
+          <a:xfrm>
+            <a:off x="9064111" y="5000209"/>
+            <a:ext cx="617926" cy="553998"/>
+          </a:xfrm>
+          <a:prstGeom prst="rect">
+            <a:avLst/>
+          </a:prstGeom>
+          <a:noFill/>
+        </p:spPr>
+        <p:txBody>
+          <a:bodyPr wrap="none" rtlCol="0">
+            <a:spAutoFit/>
+          </a:bodyPr>
+          <a:lstStyle/>
+          <a:p>
+            <a:pPr lvl="0" algn="ctr"/>
+            <a:r>
+              <a:rPr lang="en-US" sz="1200">
+                <a:solidFill>
+                  <a:prstClr val="black"/>
+                </a:solidFill>
+                <a:latin typeface="Arial" panose="020B0604020202020204" pitchFamily="34" charset="0"/>
+                <a:cs typeface="Arial" panose="020B0604020202020204" pitchFamily="34" charset="0"/>
+              </a:rPr>
+              <a:t>Payoff</a:t>
+            </a:r>
+          </a:p>
+          <a:p>
+            <a:endParaRPr lang="en-US" dirty="0"/>
+          </a:p>
+        </p:txBody>
+      </p:sp>
     </p:spTree>
     <p:extLst>
       <p:ext uri="{BB962C8B-B14F-4D97-AF65-F5344CB8AC3E}">
@@ -8027,60 +8245,14 @@
       </p:grpSpPr>
       <p:sp>
         <p:nvSpPr>
-          <p:cNvPr id="4" name="Rectangle 3"/>
+          <p:cNvPr id="85" name="Rectangle 84"/>
           <p:cNvSpPr/>
           <p:nvPr/>
         </p:nvSpPr>
         <p:spPr>
           <a:xfrm>
-            <a:off x="63499" y="1512038"/>
-            <a:ext cx="11878292" cy="4752284"/>
-          </a:xfrm>
-          <a:prstGeom prst="rect">
-            <a:avLst/>
-          </a:prstGeom>
-          <a:noFill/>
-          <a:ln>
-            <a:solidFill>
-              <a:schemeClr val="tx1"/>
-            </a:solidFill>
-          </a:ln>
-        </p:spPr>
-        <p:style>
-          <a:lnRef idx="2">
-            <a:schemeClr val="accent1">
-              <a:shade val="50000"/>
-            </a:schemeClr>
-          </a:lnRef>
-          <a:fillRef idx="1">
-            <a:schemeClr val="accent1"/>
-          </a:fillRef>
-          <a:effectRef idx="0">
-            <a:schemeClr val="accent1"/>
-          </a:effectRef>
-          <a:fontRef idx="minor">
-            <a:schemeClr val="lt1"/>
-          </a:fontRef>
-        </p:style>
-        <p:txBody>
-          <a:bodyPr rtlCol="0" anchor="ctr"/>
-          <a:lstStyle/>
-          <a:p>
-            <a:pPr algn="ctr"/>
-            <a:endParaRPr lang="en-US"/>
-          </a:p>
-        </p:txBody>
-      </p:sp>
-      <p:sp>
-        <p:nvSpPr>
-          <p:cNvPr id="6" name="Rectangle 5"/>
-          <p:cNvSpPr/>
-          <p:nvPr/>
-        </p:nvSpPr>
-        <p:spPr>
-          <a:xfrm>
-            <a:off x="298538" y="1672109"/>
-            <a:ext cx="11343001" cy="1137524"/>
+            <a:off x="298538" y="1313443"/>
+            <a:ext cx="11343001" cy="1744890"/>
           </a:xfrm>
           <a:prstGeom prst="rect">
             <a:avLst/>
@@ -8126,14 +8298,14 @@
       </p:sp>
       <p:sp>
         <p:nvSpPr>
-          <p:cNvPr id="7" name="TextBox 6"/>
+          <p:cNvPr id="90" name="TextBox 89"/>
           <p:cNvSpPr txBox="1"/>
           <p:nvPr/>
         </p:nvSpPr>
         <p:spPr>
           <a:xfrm>
-            <a:off x="114849" y="1055806"/>
-            <a:ext cx="5758761" cy="369332"/>
+            <a:off x="294586" y="1306725"/>
+            <a:ext cx="11465831" cy="2031325"/>
           </a:xfrm>
           <a:prstGeom prst="rect">
             <a:avLst/>
@@ -8147,42 +8319,6 @@
           <a:lstStyle/>
           <a:p>
             <a:r>
-              <a:rPr lang="en-US" b="1" dirty="0" smtClean="0">
-                <a:latin typeface="Arial" panose="020B0604020202020204" pitchFamily="34" charset="0"/>
-                <a:cs typeface="Arial" panose="020B0604020202020204" pitchFamily="34" charset="0"/>
-              </a:rPr>
-              <a:t>Phase 2c: social norms VS maximizing reward.</a:t>
-            </a:r>
-            <a:endParaRPr lang="en-US" b="1" dirty="0">
-              <a:latin typeface="Arial" panose="020B0604020202020204" pitchFamily="34" charset="0"/>
-              <a:cs typeface="Arial" panose="020B0604020202020204" pitchFamily="34" charset="0"/>
-            </a:endParaRPr>
-          </a:p>
-        </p:txBody>
-      </p:sp>
-      <p:sp>
-        <p:nvSpPr>
-          <p:cNvPr id="8" name="TextBox 7"/>
-          <p:cNvSpPr txBox="1"/>
-          <p:nvPr/>
-        </p:nvSpPr>
-        <p:spPr>
-          <a:xfrm>
-            <a:off x="298539" y="1750883"/>
-            <a:ext cx="11465831" cy="1169551"/>
-          </a:xfrm>
-          <a:prstGeom prst="rect">
-            <a:avLst/>
-          </a:prstGeom>
-          <a:noFill/>
-        </p:spPr>
-        <p:txBody>
-          <a:bodyPr wrap="square" rtlCol="0">
-            <a:spAutoFit/>
-          </a:bodyPr>
-          <a:lstStyle/>
-          <a:p>
-            <a:r>
               <a:rPr lang="en-US" sz="1400" b="1" dirty="0" smtClean="0">
                 <a:solidFill>
                   <a:srgbClr val="0000FF"/>
@@ -8197,7 +8333,100 @@
                 <a:latin typeface="Arial" panose="020B0604020202020204" pitchFamily="34" charset="0"/>
                 <a:cs typeface="Arial" panose="020B0604020202020204" pitchFamily="34" charset="0"/>
               </a:rPr>
-              <a:t> received an endowment of 20€.</a:t>
+              <a:t> </a:t>
+            </a:r>
+            <a:r>
+              <a:rPr lang="en-US" sz="1400" dirty="0">
+                <a:latin typeface="Arial" panose="020B0604020202020204" pitchFamily="34" charset="0"/>
+                <a:cs typeface="Arial" panose="020B0604020202020204" pitchFamily="34" charset="0"/>
+              </a:rPr>
+              <a:t>received an endowment of 20€.</a:t>
+            </a:r>
+          </a:p>
+          <a:p>
+            <a:r>
+              <a:rPr lang="en-US" sz="1400" b="1" dirty="0">
+                <a:latin typeface="Arial" panose="020B0604020202020204" pitchFamily="34" charset="0"/>
+                <a:cs typeface="Arial" panose="020B0604020202020204" pitchFamily="34" charset="0"/>
+              </a:rPr>
+              <a:t>Phase </a:t>
+            </a:r>
+            <a:r>
+              <a:rPr lang="en-US" sz="1400" b="1" dirty="0" smtClean="0">
+                <a:latin typeface="Arial" panose="020B0604020202020204" pitchFamily="34" charset="0"/>
+                <a:cs typeface="Arial" panose="020B0604020202020204" pitchFamily="34" charset="0"/>
+              </a:rPr>
+              <a:t>2c </a:t>
+            </a:r>
+            <a:r>
+              <a:rPr lang="en-US" sz="1400" b="1" dirty="0">
+                <a:latin typeface="Arial" panose="020B0604020202020204" pitchFamily="34" charset="0"/>
+                <a:cs typeface="Arial" panose="020B0604020202020204" pitchFamily="34" charset="0"/>
+              </a:rPr>
+              <a:t>(Known)</a:t>
+            </a:r>
+            <a:r>
+              <a:rPr lang="en-US" sz="1400" dirty="0">
+                <a:latin typeface="Arial" panose="020B0604020202020204" pitchFamily="34" charset="0"/>
+                <a:cs typeface="Arial" panose="020B0604020202020204" pitchFamily="34" charset="0"/>
+              </a:rPr>
+              <a:t>: </a:t>
+            </a:r>
+          </a:p>
+          <a:p>
+            <a:r>
+              <a:rPr lang="en-US" sz="1400" b="1" dirty="0">
+                <a:solidFill>
+                  <a:srgbClr val="FF0000"/>
+                </a:solidFill>
+                <a:latin typeface="Arial" panose="020B0604020202020204" pitchFamily="34" charset="0"/>
+                <a:cs typeface="Arial" panose="020B0604020202020204" pitchFamily="34" charset="0"/>
+              </a:rPr>
+              <a:t>R</a:t>
+            </a:r>
+            <a:r>
+              <a:rPr lang="en-US" sz="1400" dirty="0">
+                <a:latin typeface="Arial" panose="020B0604020202020204" pitchFamily="34" charset="0"/>
+                <a:cs typeface="Arial" panose="020B0604020202020204" pitchFamily="34" charset="0"/>
+              </a:rPr>
+              <a:t> will be generated by algorithms mimicking the behavior of participants sampled from one of 5 experiments which received a fixed (but unknown to you) endowment of [0-20€</a:t>
+            </a:r>
+            <a:r>
+              <a:rPr lang="en-US" sz="1400" dirty="0" smtClean="0">
+                <a:latin typeface="Arial" panose="020B0604020202020204" pitchFamily="34" charset="0"/>
+                <a:cs typeface="Arial" panose="020B0604020202020204" pitchFamily="34" charset="0"/>
+              </a:rPr>
+              <a:t>].</a:t>
+            </a:r>
+          </a:p>
+          <a:p>
+            <a:r>
+              <a:rPr lang="en-US" sz="1400" b="1" dirty="0">
+                <a:latin typeface="Arial" panose="020B0604020202020204" pitchFamily="34" charset="0"/>
+                <a:cs typeface="Arial" panose="020B0604020202020204" pitchFamily="34" charset="0"/>
+              </a:rPr>
+              <a:t>Phase </a:t>
+            </a:r>
+            <a:r>
+              <a:rPr lang="en-US" sz="1400" b="1" dirty="0" smtClean="0">
+                <a:latin typeface="Arial" panose="020B0604020202020204" pitchFamily="34" charset="0"/>
+                <a:cs typeface="Arial" panose="020B0604020202020204" pitchFamily="34" charset="0"/>
+              </a:rPr>
+              <a:t>2d (Unknown</a:t>
+            </a:r>
+            <a:r>
+              <a:rPr lang="en-US" sz="1400" b="1" dirty="0">
+                <a:latin typeface="Arial" panose="020B0604020202020204" pitchFamily="34" charset="0"/>
+                <a:cs typeface="Arial" panose="020B0604020202020204" pitchFamily="34" charset="0"/>
+              </a:rPr>
+              <a:t>)</a:t>
+            </a:r>
+            <a:r>
+              <a:rPr lang="en-US" sz="1400" dirty="0">
+                <a:latin typeface="Arial" panose="020B0604020202020204" pitchFamily="34" charset="0"/>
+                <a:cs typeface="Arial" panose="020B0604020202020204" pitchFamily="34" charset="0"/>
+              </a:rPr>
+              <a:t>: </a:t>
             </a:r>
           </a:p>
           <a:p>
@@ -8223,35 +8452,7 @@
                 <a:latin typeface="Arial" panose="020B0604020202020204" pitchFamily="34" charset="0"/>
                 <a:cs typeface="Arial" panose="020B0604020202020204" pitchFamily="34" charset="0"/>
               </a:rPr>
-              <a:t>You will play against </a:t>
-            </a:r>
-            <a:r>
-              <a:rPr lang="en-US" sz="1400" dirty="0" smtClean="0">
-                <a:latin typeface="Arial" panose="020B0604020202020204" pitchFamily="34" charset="0"/>
-                <a:cs typeface="Arial" panose="020B0604020202020204" pitchFamily="34" charset="0"/>
-              </a:rPr>
-              <a:t>five </a:t>
-            </a:r>
-            <a:r>
-              <a:rPr lang="en-US" sz="1400" i="1" dirty="0" smtClean="0">
-                <a:latin typeface="Arial" panose="020B0604020202020204" pitchFamily="34" charset="0"/>
-                <a:cs typeface="Arial" panose="020B0604020202020204" pitchFamily="34" charset="0"/>
-              </a:rPr>
-              <a:t>machines</a:t>
-            </a:r>
-            <a:r>
-              <a:rPr lang="en-US" sz="1400" dirty="0" smtClean="0">
-                <a:latin typeface="Arial" panose="020B0604020202020204" pitchFamily="34" charset="0"/>
-                <a:cs typeface="Arial" panose="020B0604020202020204" pitchFamily="34" charset="0"/>
-              </a:rPr>
-              <a:t> </a:t>
-            </a:r>
-            <a:r>
-              <a:rPr lang="en-US" sz="1400" dirty="0">
-                <a:latin typeface="Arial" panose="020B0604020202020204" pitchFamily="34" charset="0"/>
-                <a:cs typeface="Arial" panose="020B0604020202020204" pitchFamily="34" charset="0"/>
-              </a:rPr>
-              <a:t>which have specific (but different, and imprecise) threshold of acceptance. </a:t>
+              <a:t>is represented by different symbols</a:t>
             </a:r>
           </a:p>
           <a:p>
@@ -8303,7 +8504,7 @@
         </p:nvSpPr>
         <p:spPr>
           <a:xfrm>
-            <a:off x="401429" y="2902264"/>
+            <a:off x="401429" y="3127549"/>
             <a:ext cx="9684268" cy="276999"/>
           </a:xfrm>
           <a:prstGeom prst="rect">
@@ -10457,7 +10658,7 @@
         </p:nvSpPr>
         <p:spPr>
           <a:xfrm>
-            <a:off x="6799467" y="2976041"/>
+            <a:off x="6799467" y="3201326"/>
             <a:ext cx="132276" cy="119322"/>
           </a:xfrm>
           <a:prstGeom prst="star5">
@@ -10505,7 +10706,7 @@
         </p:nvSpPr>
         <p:spPr>
           <a:xfrm>
-            <a:off x="6415399" y="2992177"/>
+            <a:off x="6415399" y="3217462"/>
             <a:ext cx="97067" cy="88970"/>
           </a:xfrm>
           <a:prstGeom prst="rtTriangle">
@@ -10553,7 +10754,7 @@
         </p:nvSpPr>
         <p:spPr>
           <a:xfrm>
-            <a:off x="5294896" y="2507798"/>
+            <a:off x="5294896" y="2905567"/>
             <a:ext cx="97067" cy="88970"/>
           </a:xfrm>
           <a:prstGeom prst="rtTriangle">
@@ -10601,7 +10802,7 @@
         </p:nvSpPr>
         <p:spPr>
           <a:xfrm>
-            <a:off x="5452339" y="2493620"/>
+            <a:off x="5452339" y="2878137"/>
             <a:ext cx="132276" cy="119322"/>
           </a:xfrm>
           <a:prstGeom prst="star5">
@@ -11007,7 +11208,7 @@
           <p:spPr>
             <a:xfrm>
               <a:off x="7522252" y="5006920"/>
-              <a:ext cx="1478481" cy="646331"/>
+              <a:ext cx="1478481" cy="830997"/>
             </a:xfrm>
             <a:prstGeom prst="rect">
               <a:avLst/>
@@ -11021,12 +11222,19 @@
             <a:lstStyle/>
             <a:p>
               <a:pPr algn="ctr"/>
+              <a:endParaRPr lang="en-US" sz="1200" dirty="0" smtClean="0">
+                <a:latin typeface="Arial" panose="020B0604020202020204" pitchFamily="34" charset="0"/>
+                <a:cs typeface="Arial" panose="020B0604020202020204" pitchFamily="34" charset="0"/>
+              </a:endParaRPr>
+            </a:p>
+            <a:p>
+              <a:pPr algn="ctr"/>
               <a:r>
                 <a:rPr lang="en-US" sz="1200" dirty="0" smtClean="0">
                   <a:latin typeface="Arial" panose="020B0604020202020204" pitchFamily="34" charset="0"/>
                   <a:cs typeface="Arial" panose="020B0604020202020204" pitchFamily="34" charset="0"/>
                 </a:rPr>
-                <a:t>your final payoff </a:t>
+                <a:t>You = €7</a:t>
               </a:r>
             </a:p>
             <a:p>
@@ -11036,8 +11244,12 @@
                   <a:latin typeface="Arial" panose="020B0604020202020204" pitchFamily="34" charset="0"/>
                   <a:cs typeface="Arial" panose="020B0604020202020204" pitchFamily="34" charset="0"/>
                 </a:rPr>
-                <a:t>is</a:t>
+                <a:t> </a:t>
               </a:r>
+              <a:endParaRPr lang="en-US" sz="1200" dirty="0">
+                <a:latin typeface="Arial" panose="020B0604020202020204" pitchFamily="34" charset="0"/>
+                <a:cs typeface="Arial" panose="020B0604020202020204" pitchFamily="34" charset="0"/>
+              </a:endParaRPr>
             </a:p>
             <a:p>
               <a:pPr algn="ctr"/>
@@ -11046,14 +11258,21 @@
                   <a:latin typeface="Arial" panose="020B0604020202020204" pitchFamily="34" charset="0"/>
                   <a:cs typeface="Arial" panose="020B0604020202020204" pitchFamily="34" charset="0"/>
                 </a:rPr>
-                <a:t>2</a:t>
+                <a:t> </a:t>
               </a:r>
               <a:r>
                 <a:rPr lang="en-US" sz="1200" dirty="0" smtClean="0">
                   <a:latin typeface="Arial" panose="020B0604020202020204" pitchFamily="34" charset="0"/>
                   <a:cs typeface="Arial" panose="020B0604020202020204" pitchFamily="34" charset="0"/>
                 </a:rPr>
-                <a:t>0 – 13 = 7€</a:t>
+                <a:t>        </a:t>
+              </a:r>
+              <a:r>
+                <a:rPr lang="en-US" sz="1200" dirty="0" smtClean="0">
+                  <a:latin typeface="Arial" panose="020B0604020202020204" pitchFamily="34" charset="0"/>
+                  <a:cs typeface="Arial" panose="020B0604020202020204" pitchFamily="34" charset="0"/>
+                </a:rPr>
+                <a:t>= €13</a:t>
               </a:r>
               <a:endParaRPr lang="en-US" sz="1200" dirty="0">
                 <a:latin typeface="Arial" panose="020B0604020202020204" pitchFamily="34" charset="0"/>
@@ -11122,6 +11341,189 @@
               <a:latin typeface="Arial" panose="020B0604020202020204" pitchFamily="34" charset="0"/>
               <a:cs typeface="Arial" panose="020B0604020202020204" pitchFamily="34" charset="0"/>
             </a:endParaRPr>
+          </a:p>
+        </p:txBody>
+      </p:sp>
+      <p:sp>
+        <p:nvSpPr>
+          <p:cNvPr id="81" name="Rectangle 80"/>
+          <p:cNvSpPr/>
+          <p:nvPr/>
+        </p:nvSpPr>
+        <p:spPr>
+          <a:xfrm>
+            <a:off x="63499" y="1266113"/>
+            <a:ext cx="11863458" cy="4998209"/>
+          </a:xfrm>
+          <a:prstGeom prst="rect">
+            <a:avLst/>
+          </a:prstGeom>
+          <a:noFill/>
+          <a:ln>
+            <a:solidFill>
+              <a:schemeClr val="tx1"/>
+            </a:solidFill>
+          </a:ln>
+        </p:spPr>
+        <p:style>
+          <a:lnRef idx="2">
+            <a:schemeClr val="accent1">
+              <a:shade val="50000"/>
+            </a:schemeClr>
+          </a:lnRef>
+          <a:fillRef idx="1">
+            <a:schemeClr val="accent1"/>
+          </a:fillRef>
+          <a:effectRef idx="0">
+            <a:schemeClr val="accent1"/>
+          </a:effectRef>
+          <a:fontRef idx="minor">
+            <a:schemeClr val="lt1"/>
+          </a:fontRef>
+        </p:style>
+        <p:txBody>
+          <a:bodyPr rtlCol="0" anchor="ctr"/>
+          <a:lstStyle/>
+          <a:p>
+            <a:pPr algn="ctr"/>
+            <a:endParaRPr lang="en-US"/>
+          </a:p>
+        </p:txBody>
+      </p:sp>
+      <p:sp>
+        <p:nvSpPr>
+          <p:cNvPr id="82" name="TextBox 81"/>
+          <p:cNvSpPr txBox="1"/>
+          <p:nvPr/>
+        </p:nvSpPr>
+        <p:spPr>
+          <a:xfrm>
+            <a:off x="114849" y="896781"/>
+            <a:ext cx="5758761" cy="369332"/>
+          </a:xfrm>
+          <a:prstGeom prst="rect">
+            <a:avLst/>
+          </a:prstGeom>
+          <a:noFill/>
+        </p:spPr>
+        <p:txBody>
+          <a:bodyPr wrap="square" rtlCol="0">
+            <a:spAutoFit/>
+          </a:bodyPr>
+          <a:lstStyle/>
+          <a:p>
+            <a:r>
+              <a:rPr lang="en-US" b="1" dirty="0" smtClean="0">
+                <a:latin typeface="Arial" panose="020B0604020202020204" pitchFamily="34" charset="0"/>
+                <a:cs typeface="Arial" panose="020B0604020202020204" pitchFamily="34" charset="0"/>
+              </a:rPr>
+              <a:t>Phase </a:t>
+            </a:r>
+            <a:r>
+              <a:rPr lang="en-US" b="1" dirty="0" smtClean="0">
+                <a:latin typeface="Arial" panose="020B0604020202020204" pitchFamily="34" charset="0"/>
+                <a:cs typeface="Arial" panose="020B0604020202020204" pitchFamily="34" charset="0"/>
+              </a:rPr>
+              <a:t>2c/d: </a:t>
+            </a:r>
+            <a:r>
+              <a:rPr lang="en-US" b="1" dirty="0" smtClean="0">
+                <a:latin typeface="Arial" panose="020B0604020202020204" pitchFamily="34" charset="0"/>
+                <a:cs typeface="Arial" panose="020B0604020202020204" pitchFamily="34" charset="0"/>
+              </a:rPr>
+              <a:t>social norms VS maximizing reward.</a:t>
+            </a:r>
+            <a:endParaRPr lang="en-US" b="1" dirty="0">
+              <a:latin typeface="Arial" panose="020B0604020202020204" pitchFamily="34" charset="0"/>
+              <a:cs typeface="Arial" panose="020B0604020202020204" pitchFamily="34" charset="0"/>
+            </a:endParaRPr>
+          </a:p>
+        </p:txBody>
+      </p:sp>
+      <p:sp>
+        <p:nvSpPr>
+          <p:cNvPr id="86" name="Rectangle 85"/>
+          <p:cNvSpPr/>
+          <p:nvPr/>
+        </p:nvSpPr>
+        <p:spPr>
+          <a:xfrm>
+            <a:off x="9080974" y="5676699"/>
+            <a:ext cx="292100" cy="215642"/>
+          </a:xfrm>
+          <a:prstGeom prst="rect">
+            <a:avLst/>
+          </a:prstGeom>
+          <a:solidFill>
+            <a:schemeClr val="bg1"/>
+          </a:solidFill>
+          <a:ln>
+            <a:solidFill>
+              <a:schemeClr val="tx1"/>
+            </a:solidFill>
+          </a:ln>
+        </p:spPr>
+        <p:style>
+          <a:lnRef idx="2">
+            <a:schemeClr val="accent1">
+              <a:shade val="50000"/>
+            </a:schemeClr>
+          </a:lnRef>
+          <a:fillRef idx="1">
+            <a:schemeClr val="accent1"/>
+          </a:fillRef>
+          <a:effectRef idx="0">
+            <a:schemeClr val="accent1"/>
+          </a:effectRef>
+          <a:fontRef idx="minor">
+            <a:schemeClr val="lt1"/>
+          </a:fontRef>
+        </p:style>
+        <p:txBody>
+          <a:bodyPr rtlCol="0" anchor="ctr"/>
+          <a:lstStyle/>
+          <a:p>
+            <a:pPr algn="ctr"/>
+            <a:endParaRPr lang="en-US"/>
+          </a:p>
+        </p:txBody>
+      </p:sp>
+      <p:sp>
+        <p:nvSpPr>
+          <p:cNvPr id="3" name="TextBox 2"/>
+          <p:cNvSpPr txBox="1"/>
+          <p:nvPr/>
+        </p:nvSpPr>
+        <p:spPr>
+          <a:xfrm>
+            <a:off x="9064111" y="5000209"/>
+            <a:ext cx="617926" cy="553998"/>
+          </a:xfrm>
+          <a:prstGeom prst="rect">
+            <a:avLst/>
+          </a:prstGeom>
+          <a:noFill/>
+        </p:spPr>
+        <p:txBody>
+          <a:bodyPr wrap="none" rtlCol="0">
+            <a:spAutoFit/>
+          </a:bodyPr>
+          <a:lstStyle/>
+          <a:p>
+            <a:pPr lvl="0" algn="ctr"/>
+            <a:r>
+              <a:rPr lang="en-US" sz="1200">
+                <a:solidFill>
+                  <a:prstClr val="black"/>
+                </a:solidFill>
+                <a:latin typeface="Arial" panose="020B0604020202020204" pitchFamily="34" charset="0"/>
+                <a:cs typeface="Arial" panose="020B0604020202020204" pitchFamily="34" charset="0"/>
+              </a:rPr>
+              <a:t>Payoff</a:t>
+            </a:r>
+          </a:p>
+          <a:p>
+            <a:endParaRPr lang="en-US" dirty="0"/>
           </a:p>
         </p:txBody>
       </p:sp>
@@ -13257,7 +13659,7 @@
         <p:spPr>
           <a:xfrm>
             <a:off x="0" y="8092"/>
-            <a:ext cx="12119054" cy="7509748"/>
+            <a:ext cx="12119054" cy="7017306"/>
           </a:xfrm>
           <a:prstGeom prst="rect">
             <a:avLst/>
@@ -13566,7 +13968,7 @@
                 <a:latin typeface="Arial" panose="020B0604020202020204" pitchFamily="34" charset="0"/>
                 <a:cs typeface="Arial" panose="020B0604020202020204" pitchFamily="34" charset="0"/>
               </a:rPr>
-              <a:t>social-known </a:t>
+              <a:t>the social-unknown </a:t>
             </a:r>
             <a:r>
               <a:rPr lang="en-US" sz="1600" b="1" dirty="0">
@@ -13580,7 +13982,7 @@
                 <a:latin typeface="Arial" panose="020B0604020202020204" pitchFamily="34" charset="0"/>
                 <a:cs typeface="Arial" panose="020B0604020202020204" pitchFamily="34" charset="0"/>
               </a:rPr>
-              <a:t>social-unknown conditions</a:t>
+              <a:t>both social-unknown and non-social conditions, the latter two of which do not differ</a:t>
             </a:r>
             <a:r>
               <a:rPr lang="en-US" sz="1600" dirty="0" smtClean="0">
@@ -13589,6 +13991,10 @@
               </a:rPr>
               <a:t>:</a:t>
             </a:r>
+            <a:endParaRPr lang="en-US" sz="1600" dirty="0" smtClean="0">
+              <a:latin typeface="Arial" panose="020B0604020202020204" pitchFamily="34" charset="0"/>
+              <a:cs typeface="Arial" panose="020B0604020202020204" pitchFamily="34" charset="0"/>
+            </a:endParaRPr>
           </a:p>
           <a:p>
             <a:pPr marL="742950" lvl="1" indent="-285750" algn="just">
@@ -13628,79 +14034,21 @@
                 <a:latin typeface="Arial" panose="020B0604020202020204" pitchFamily="34" charset="0"/>
                 <a:cs typeface="Arial" panose="020B0604020202020204" pitchFamily="34" charset="0"/>
               </a:rPr>
-              <a:t>(</a:t>
-            </a:r>
-            <a:r>
-              <a:rPr lang="en-US" sz="1600" dirty="0" err="1" smtClean="0">
-                <a:latin typeface="Arial" panose="020B0604020202020204" pitchFamily="34" charset="0"/>
-                <a:cs typeface="Arial" panose="020B0604020202020204" pitchFamily="34" charset="0"/>
-              </a:rPr>
-              <a:t>i</a:t>
+              <a:t>using </a:t>
             </a:r>
             <a:r>
               <a:rPr lang="en-US" sz="1600" dirty="0" smtClean="0">
                 <a:latin typeface="Arial" panose="020B0604020202020204" pitchFamily="34" charset="0"/>
                 <a:cs typeface="Arial" panose="020B0604020202020204" pitchFamily="34" charset="0"/>
               </a:rPr>
-              <a:t>) using the opacity of what constitutes fair as an excuse to eschew fairness and maximize profit, or (ii) exploring the acceptance space in order to learn what constitutes fair.</a:t>
-            </a:r>
-          </a:p>
-          <a:p>
-            <a:pPr algn="just"/>
-            <a:endParaRPr lang="en-US" sz="1600" dirty="0">
-              <a:latin typeface="Arial" panose="020B0604020202020204" pitchFamily="34" charset="0"/>
-              <a:cs typeface="Arial" panose="020B0604020202020204" pitchFamily="34" charset="0"/>
-            </a:endParaRPr>
-          </a:p>
-          <a:p>
-            <a:pPr algn="just"/>
+              <a:t>the opacity of what constitutes fair as an excuse to eschew fairness and maximize </a:t>
+            </a:r>
             <a:r>
               <a:rPr lang="en-US" sz="1600" dirty="0" smtClean="0">
                 <a:latin typeface="Arial" panose="020B0604020202020204" pitchFamily="34" charset="0"/>
                 <a:cs typeface="Arial" panose="020B0604020202020204" pitchFamily="34" charset="0"/>
               </a:rPr>
-              <a:t>5: </a:t>
-            </a:r>
-            <a:r>
-              <a:rPr lang="en-US" sz="1600" b="1" dirty="0">
-                <a:latin typeface="Arial" panose="020B0604020202020204" pitchFamily="34" charset="0"/>
-                <a:cs typeface="Arial" panose="020B0604020202020204" pitchFamily="34" charset="0"/>
-              </a:rPr>
-              <a:t>L</a:t>
-            </a:r>
-            <a:r>
-              <a:rPr lang="en-US" sz="1600" b="1" dirty="0" smtClean="0">
-                <a:latin typeface="Arial" panose="020B0604020202020204" pitchFamily="34" charset="0"/>
-                <a:cs typeface="Arial" panose="020B0604020202020204" pitchFamily="34" charset="0"/>
-              </a:rPr>
-              <a:t>earning </a:t>
-            </a:r>
-            <a:r>
-              <a:rPr lang="en-US" sz="1600" b="1" i="1" dirty="0" smtClean="0">
-                <a:latin typeface="Arial" panose="020B0604020202020204" pitchFamily="34" charset="0"/>
-                <a:cs typeface="Arial" panose="020B0604020202020204" pitchFamily="34" charset="0"/>
-              </a:rPr>
-              <a:t>does not</a:t>
-            </a:r>
-            <a:r>
-              <a:rPr lang="en-US" sz="1600" b="1" dirty="0" smtClean="0">
-                <a:latin typeface="Arial" panose="020B0604020202020204" pitchFamily="34" charset="0"/>
-                <a:cs typeface="Arial" panose="020B0604020202020204" pitchFamily="34" charset="0"/>
-              </a:rPr>
-              <a:t> differ between social-known and non-social conditions:</a:t>
-            </a:r>
-          </a:p>
-          <a:p>
-            <a:pPr marL="742950" lvl="1" indent="-285750" algn="just">
-              <a:buFont typeface="Arial" charset="0"/>
-              <a:buChar char="•"/>
-            </a:pPr>
-            <a:r>
-              <a:rPr lang="en-US" sz="1600" dirty="0" smtClean="0">
-                <a:latin typeface="Arial" panose="020B0604020202020204" pitchFamily="34" charset="0"/>
-                <a:cs typeface="Arial" panose="020B0604020202020204" pitchFamily="34" charset="0"/>
-              </a:rPr>
-              <a:t>Subjects explore the acceptance range of responders in both conditions</a:t>
+              <a:t>profit, and explore the acceptance space in the same way as in the non-social condition</a:t>
             </a:r>
             <a:endParaRPr lang="en-US" sz="1600" dirty="0">
               <a:latin typeface="Arial" panose="020B0604020202020204" pitchFamily="34" charset="0"/>
@@ -13869,8 +14217,8 @@
         </p:nvSpPr>
         <p:spPr>
           <a:xfrm>
-            <a:off x="0" y="8092"/>
-            <a:ext cx="12119054" cy="2339102"/>
+            <a:off x="145774" y="168519"/>
+            <a:ext cx="11729069" cy="4062651"/>
           </a:xfrm>
           <a:prstGeom prst="rect">
             <a:avLst/>
@@ -13883,87 +14231,22 @@
           </a:bodyPr>
           <a:lstStyle/>
           <a:p>
+            <a:r>
+              <a:rPr lang="en-US" b="1" dirty="0" smtClean="0">
+                <a:latin typeface="Arial" charset="0"/>
+                <a:ea typeface="Arial" charset="0"/>
+                <a:cs typeface="Arial" charset="0"/>
+              </a:rPr>
+              <a:t>Supplementary material</a:t>
+            </a:r>
+            <a:endParaRPr lang="en-US" b="1" dirty="0">
+              <a:latin typeface="Arial" charset="0"/>
+              <a:ea typeface="Arial" charset="0"/>
+              <a:cs typeface="Arial" charset="0"/>
+            </a:endParaRPr>
+          </a:p>
+          <a:p>
             <a:pPr algn="just"/>
-            <a:r>
-              <a:rPr lang="en-US" b="1" dirty="0" smtClean="0">
-                <a:latin typeface="Arial" panose="020B0604020202020204" pitchFamily="34" charset="0"/>
-                <a:cs typeface="Arial" panose="020B0604020202020204" pitchFamily="34" charset="0"/>
-              </a:rPr>
-              <a:t>Open questions</a:t>
-            </a:r>
-            <a:endParaRPr lang="en-US" b="1" dirty="0" smtClean="0">
-              <a:latin typeface="Arial" panose="020B0604020202020204" pitchFamily="34" charset="0"/>
-              <a:cs typeface="Arial" panose="020B0604020202020204" pitchFamily="34" charset="0"/>
-            </a:endParaRPr>
-          </a:p>
-          <a:p>
-            <a:pPr algn="just"/>
-            <a:endParaRPr lang="en-US" sz="1600" b="1" u="sng" dirty="0" smtClean="0">
-              <a:latin typeface="Arial" panose="020B0604020202020204" pitchFamily="34" charset="0"/>
-              <a:cs typeface="Arial" panose="020B0604020202020204" pitchFamily="34" charset="0"/>
-            </a:endParaRPr>
-          </a:p>
-          <a:p>
-            <a:pPr algn="just"/>
-            <a:r>
-              <a:rPr lang="en-US" sz="1600" dirty="0" smtClean="0">
-                <a:latin typeface="Arial" panose="020B0604020202020204" pitchFamily="34" charset="0"/>
-                <a:cs typeface="Arial" panose="020B0604020202020204" pitchFamily="34" charset="0"/>
-              </a:rPr>
-              <a:t>1</a:t>
-            </a:r>
-            <a:r>
-              <a:rPr lang="en-US" sz="1600" dirty="0" smtClean="0">
-                <a:latin typeface="Arial" panose="020B0604020202020204" pitchFamily="34" charset="0"/>
-                <a:cs typeface="Arial" panose="020B0604020202020204" pitchFamily="34" charset="0"/>
-              </a:rPr>
-              <a:t>: Will the functions estimated from the dictator game help us to tease apart whether subjects in the social known condition are searching for fairness or maximizing profit?</a:t>
-            </a:r>
-          </a:p>
-          <a:p>
-            <a:pPr algn="just"/>
-            <a:endParaRPr lang="en-US" sz="1600" dirty="0" smtClean="0">
-              <a:latin typeface="Arial" panose="020B0604020202020204" pitchFamily="34" charset="0"/>
-              <a:cs typeface="Arial" panose="020B0604020202020204" pitchFamily="34" charset="0"/>
-            </a:endParaRPr>
-          </a:p>
-          <a:p>
-            <a:pPr algn="just"/>
-            <a:r>
-              <a:rPr lang="en-US" sz="1600" dirty="0" smtClean="0">
-                <a:latin typeface="Arial" panose="020B0604020202020204" pitchFamily="34" charset="0"/>
-                <a:cs typeface="Arial" panose="020B0604020202020204" pitchFamily="34" charset="0"/>
-              </a:rPr>
-              <a:t>2: Will score on the risk task </a:t>
-            </a:r>
-            <a:r>
-              <a:rPr lang="en-US" sz="1600" smtClean="0">
-                <a:latin typeface="Arial" panose="020B0604020202020204" pitchFamily="34" charset="0"/>
-                <a:cs typeface="Arial" panose="020B0604020202020204" pitchFamily="34" charset="0"/>
-              </a:rPr>
-              <a:t>predict asymmetry </a:t>
-            </a:r>
-            <a:r>
-              <a:rPr lang="en-US" sz="1600" dirty="0" smtClean="0">
-                <a:latin typeface="Arial" panose="020B0604020202020204" pitchFamily="34" charset="0"/>
-                <a:cs typeface="Arial" panose="020B0604020202020204" pitchFamily="34" charset="0"/>
-              </a:rPr>
-              <a:t>in learning rates differentially for social and non-social conditions? In other words, will the risk assessed from the </a:t>
-            </a:r>
-            <a:r>
-              <a:rPr lang="en-US" sz="1600" dirty="0" err="1" smtClean="0">
-                <a:latin typeface="Arial" panose="020B0604020202020204" pitchFamily="34" charset="0"/>
-                <a:cs typeface="Arial" panose="020B0604020202020204" pitchFamily="34" charset="0"/>
-              </a:rPr>
-              <a:t>Eckel</a:t>
-            </a:r>
-            <a:r>
-              <a:rPr lang="en-US" sz="1600" dirty="0" smtClean="0">
-                <a:latin typeface="Arial" panose="020B0604020202020204" pitchFamily="34" charset="0"/>
-                <a:cs typeface="Arial" panose="020B0604020202020204" pitchFamily="34" charset="0"/>
-              </a:rPr>
-              <a:t>-Grossman lottery apply only to another lottery situation, or equally well to a socially charged situation?</a:t>
-            </a:r>
             <a:endParaRPr lang="en-US" sz="1600" dirty="0">
               <a:latin typeface="Arial" panose="020B0604020202020204" pitchFamily="34" charset="0"/>
               <a:cs typeface="Arial" panose="020B0604020202020204" pitchFamily="34" charset="0"/>
@@ -13976,9 +14259,112 @@
                 <a:latin typeface="Arial" panose="020B0604020202020204" pitchFamily="34" charset="0"/>
                 <a:cs typeface="Arial" panose="020B0604020202020204" pitchFamily="34" charset="0"/>
               </a:rPr>
-              <a:t> </a:t>
-            </a:r>
+              <a:t>If we estimate that each trial in the UG will take ~6 seconds, with a 4 second inter-stimulus interval, then we have 120 trials for the UG.</a:t>
+            </a:r>
+          </a:p>
+          <a:p>
+            <a:pPr algn="just"/>
             <a:endParaRPr lang="en-US" sz="1600" dirty="0">
+              <a:latin typeface="Arial" panose="020B0604020202020204" pitchFamily="34" charset="0"/>
+              <a:cs typeface="Arial" panose="020B0604020202020204" pitchFamily="34" charset="0"/>
+            </a:endParaRPr>
+          </a:p>
+          <a:p>
+            <a:pPr algn="just"/>
+            <a:r>
+              <a:rPr lang="en-US" sz="1600" dirty="0" smtClean="0">
+                <a:latin typeface="Arial" panose="020B0604020202020204" pitchFamily="34" charset="0"/>
+                <a:cs typeface="Arial" panose="020B0604020202020204" pitchFamily="34" charset="0"/>
+              </a:rPr>
+              <a:t>In order to help decide how many scenarios/environment to include, we simulated 40 subjects playing 120 trials of the UG with 3 (40 trials per environment), 4 (30 trials per </a:t>
+            </a:r>
+            <a:r>
+              <a:rPr lang="en-US" sz="1600" dirty="0">
+                <a:latin typeface="Arial" panose="020B0604020202020204" pitchFamily="34" charset="0"/>
+                <a:cs typeface="Arial" panose="020B0604020202020204" pitchFamily="34" charset="0"/>
+              </a:rPr>
+              <a:t>environment</a:t>
+            </a:r>
+            <a:r>
+              <a:rPr lang="en-US" sz="1600" dirty="0" smtClean="0">
+                <a:latin typeface="Arial" panose="020B0604020202020204" pitchFamily="34" charset="0"/>
+                <a:cs typeface="Arial" panose="020B0604020202020204" pitchFamily="34" charset="0"/>
+              </a:rPr>
+              <a:t>), and 5 (24 trials per </a:t>
+            </a:r>
+            <a:r>
+              <a:rPr lang="en-US" sz="1600" dirty="0">
+                <a:latin typeface="Arial" panose="020B0604020202020204" pitchFamily="34" charset="0"/>
+                <a:cs typeface="Arial" panose="020B0604020202020204" pitchFamily="34" charset="0"/>
+              </a:rPr>
+              <a:t>environment</a:t>
+            </a:r>
+            <a:r>
+              <a:rPr lang="en-US" sz="1600" dirty="0" smtClean="0">
+                <a:latin typeface="Arial" panose="020B0604020202020204" pitchFamily="34" charset="0"/>
+                <a:cs typeface="Arial" panose="020B0604020202020204" pitchFamily="34" charset="0"/>
+              </a:rPr>
+              <a:t>) in order to test for differences in parameter recovery and model identifiability. </a:t>
+            </a:r>
+          </a:p>
+          <a:p>
+            <a:pPr algn="just"/>
+            <a:endParaRPr lang="en-US" sz="1600" dirty="0">
+              <a:latin typeface="Arial" panose="020B0604020202020204" pitchFamily="34" charset="0"/>
+              <a:cs typeface="Arial" panose="020B0604020202020204" pitchFamily="34" charset="0"/>
+            </a:endParaRPr>
+          </a:p>
+          <a:p>
+            <a:pPr algn="just"/>
+            <a:r>
+              <a:rPr lang="en-US" sz="1600" dirty="0" smtClean="0">
+                <a:latin typeface="Arial" panose="020B0604020202020204" pitchFamily="34" charset="0"/>
+                <a:cs typeface="Arial" panose="020B0604020202020204" pitchFamily="34" charset="0"/>
+              </a:rPr>
+              <a:t>In every case, parameter recovery was highly significant, however 5 environments slightly outperformed simulations with 3 and 4 conditions. </a:t>
+            </a:r>
+          </a:p>
+          <a:p>
+            <a:pPr algn="just"/>
+            <a:endParaRPr lang="en-US" sz="1600" dirty="0">
+              <a:latin typeface="Arial" panose="020B0604020202020204" pitchFamily="34" charset="0"/>
+              <a:cs typeface="Arial" panose="020B0604020202020204" pitchFamily="34" charset="0"/>
+            </a:endParaRPr>
+          </a:p>
+          <a:p>
+            <a:pPr algn="just"/>
+            <a:r>
+              <a:rPr lang="en-US" sz="1600" dirty="0" smtClean="0">
+                <a:latin typeface="Arial" panose="020B0604020202020204" pitchFamily="34" charset="0"/>
+                <a:cs typeface="Arial" panose="020B0604020202020204" pitchFamily="34" charset="0"/>
+              </a:rPr>
+              <a:t>There was no difference in model identifiability</a:t>
+            </a:r>
+            <a:r>
+              <a:rPr lang="en-US" sz="1600" dirty="0" smtClean="0">
+                <a:latin typeface="Arial" panose="020B0604020202020204" pitchFamily="34" charset="0"/>
+                <a:cs typeface="Arial" panose="020B0604020202020204" pitchFamily="34" charset="0"/>
+              </a:rPr>
+              <a:t>.</a:t>
+            </a:r>
+          </a:p>
+          <a:p>
+            <a:pPr algn="just"/>
+            <a:endParaRPr lang="en-US" sz="1600" dirty="0">
+              <a:latin typeface="Arial" panose="020B0604020202020204" pitchFamily="34" charset="0"/>
+              <a:cs typeface="Arial" panose="020B0604020202020204" pitchFamily="34" charset="0"/>
+            </a:endParaRPr>
+          </a:p>
+          <a:p>
+            <a:pPr algn="just"/>
+            <a:r>
+              <a:rPr lang="en-US" sz="1600" dirty="0" smtClean="0">
+                <a:latin typeface="Arial" panose="020B0604020202020204" pitchFamily="34" charset="0"/>
+                <a:cs typeface="Arial" panose="020B0604020202020204" pitchFamily="34" charset="0"/>
+              </a:rPr>
+              <a:t>We also ran simulations for prior estimation and found little difference between 8, 10, and 12 repetitions of each division possibility. </a:t>
+            </a:r>
+            <a:endParaRPr lang="en-US" sz="1600" dirty="0" smtClean="0">
               <a:latin typeface="Arial" panose="020B0604020202020204" pitchFamily="34" charset="0"/>
               <a:cs typeface="Arial" panose="020B0604020202020204" pitchFamily="34" charset="0"/>
             </a:endParaRPr>
@@ -13988,7 +14374,7 @@
     </p:spTree>
     <p:extLst>
       <p:ext uri="{BB962C8B-B14F-4D97-AF65-F5344CB8AC3E}">
-        <p14:creationId xmlns:p14="http://schemas.microsoft.com/office/powerpoint/2010/main" val="1506796532"/>
+        <p14:creationId xmlns:p14="http://schemas.microsoft.com/office/powerpoint/2010/main" val="142249718"/>
       </p:ext>
     </p:extLst>
   </p:cSld>
@@ -14031,7 +14417,7 @@
         <p:spPr>
           <a:xfrm>
             <a:off x="145774" y="168519"/>
-            <a:ext cx="11729069" cy="4062651"/>
+            <a:ext cx="11729069" cy="1354217"/>
           </a:xfrm>
           <a:prstGeom prst="rect">
             <a:avLst/>
@@ -14050,136 +14436,52 @@
                 <a:ea typeface="Arial" charset="0"/>
                 <a:cs typeface="Arial" charset="0"/>
               </a:rPr>
-              <a:t>Supplementary material</a:t>
-            </a:r>
-            <a:endParaRPr lang="en-US" b="1" dirty="0">
-              <a:latin typeface="Arial" charset="0"/>
-              <a:ea typeface="Arial" charset="0"/>
-              <a:cs typeface="Arial" charset="0"/>
-            </a:endParaRPr>
-          </a:p>
-          <a:p>
-            <a:pPr algn="just"/>
+              <a:t>Ideas/Questions</a:t>
+            </a:r>
+          </a:p>
+          <a:p>
             <a:endParaRPr lang="en-US" sz="1600" dirty="0">
               <a:latin typeface="Arial" panose="020B0604020202020204" pitchFamily="34" charset="0"/>
               <a:cs typeface="Arial" panose="020B0604020202020204" pitchFamily="34" charset="0"/>
             </a:endParaRPr>
           </a:p>
           <a:p>
-            <a:pPr algn="just"/>
             <a:r>
               <a:rPr lang="en-US" sz="1600" dirty="0" smtClean="0">
-                <a:latin typeface="Arial" panose="020B0604020202020204" pitchFamily="34" charset="0"/>
-                <a:cs typeface="Arial" panose="020B0604020202020204" pitchFamily="34" charset="0"/>
-              </a:rPr>
-              <a:t>If we estimate that each trial in the UG will take ~6 seconds, with a 4 second inter-stimulus interval, then we have 120 trials for the UG.</a:t>
-            </a:r>
-          </a:p>
-          <a:p>
-            <a:pPr algn="just"/>
+                <a:latin typeface="Arial" charset="0"/>
+                <a:ea typeface="Arial" charset="0"/>
+                <a:cs typeface="Arial" charset="0"/>
+              </a:rPr>
+              <a:t>Could starting in the non-social condition lead to more exploratory behavior in the social condition? If it just puts people into that mode</a:t>
+            </a:r>
+            <a:r>
+              <a:rPr lang="mr-IN" sz="1600" dirty="0" smtClean="0">
+                <a:latin typeface="Arial" charset="0"/>
+                <a:ea typeface="Arial" charset="0"/>
+                <a:cs typeface="Arial" charset="0"/>
+              </a:rPr>
+              <a:t>…</a:t>
+            </a:r>
+            <a:r>
+              <a:rPr lang="en-US" sz="1600" dirty="0" smtClean="0">
+                <a:latin typeface="Arial" charset="0"/>
+                <a:ea typeface="Arial" charset="0"/>
+                <a:cs typeface="Arial" charset="0"/>
+              </a:rPr>
+              <a:t> I would think that if there is an order effect, non-social -&gt; social affects social, but social -&gt; non-social doesn’t </a:t>
+            </a:r>
+            <a:r>
+              <a:rPr lang="en-US" sz="1600" smtClean="0">
+                <a:latin typeface="Arial" charset="0"/>
+                <a:ea typeface="Arial" charset="0"/>
+                <a:cs typeface="Arial" charset="0"/>
+              </a:rPr>
+              <a:t>effect non-social. </a:t>
+            </a:r>
             <a:endParaRPr lang="en-US" sz="1600" dirty="0">
-              <a:latin typeface="Arial" panose="020B0604020202020204" pitchFamily="34" charset="0"/>
-              <a:cs typeface="Arial" panose="020B0604020202020204" pitchFamily="34" charset="0"/>
-            </a:endParaRPr>
-          </a:p>
-          <a:p>
-            <a:pPr algn="just"/>
-            <a:r>
-              <a:rPr lang="en-US" sz="1600" dirty="0" smtClean="0">
-                <a:latin typeface="Arial" panose="020B0604020202020204" pitchFamily="34" charset="0"/>
-                <a:cs typeface="Arial" panose="020B0604020202020204" pitchFamily="34" charset="0"/>
-              </a:rPr>
-              <a:t>In order to help decide how many scenarios/environment to include, we simulated 40 subjects playing 120 trials of the UG with 3 (40 trials per environment), 4 (30 trials per </a:t>
-            </a:r>
-            <a:r>
-              <a:rPr lang="en-US" sz="1600" dirty="0">
-                <a:latin typeface="Arial" panose="020B0604020202020204" pitchFamily="34" charset="0"/>
-                <a:cs typeface="Arial" panose="020B0604020202020204" pitchFamily="34" charset="0"/>
-              </a:rPr>
-              <a:t>environment</a:t>
-            </a:r>
-            <a:r>
-              <a:rPr lang="en-US" sz="1600" dirty="0" smtClean="0">
-                <a:latin typeface="Arial" panose="020B0604020202020204" pitchFamily="34" charset="0"/>
-                <a:cs typeface="Arial" panose="020B0604020202020204" pitchFamily="34" charset="0"/>
-              </a:rPr>
-              <a:t>), and 5 (24 trials per </a:t>
-            </a:r>
-            <a:r>
-              <a:rPr lang="en-US" sz="1600" dirty="0">
-                <a:latin typeface="Arial" panose="020B0604020202020204" pitchFamily="34" charset="0"/>
-                <a:cs typeface="Arial" panose="020B0604020202020204" pitchFamily="34" charset="0"/>
-              </a:rPr>
-              <a:t>environment</a:t>
-            </a:r>
-            <a:r>
-              <a:rPr lang="en-US" sz="1600" dirty="0" smtClean="0">
-                <a:latin typeface="Arial" panose="020B0604020202020204" pitchFamily="34" charset="0"/>
-                <a:cs typeface="Arial" panose="020B0604020202020204" pitchFamily="34" charset="0"/>
-              </a:rPr>
-              <a:t>) in order to test for differences in parameter recovery and model identifiability. </a:t>
-            </a:r>
-          </a:p>
-          <a:p>
-            <a:pPr algn="just"/>
-            <a:endParaRPr lang="en-US" sz="1600" dirty="0">
-              <a:latin typeface="Arial" panose="020B0604020202020204" pitchFamily="34" charset="0"/>
-              <a:cs typeface="Arial" panose="020B0604020202020204" pitchFamily="34" charset="0"/>
-            </a:endParaRPr>
-          </a:p>
-          <a:p>
-            <a:pPr algn="just"/>
-            <a:r>
-              <a:rPr lang="en-US" sz="1600" dirty="0" smtClean="0">
-                <a:latin typeface="Arial" panose="020B0604020202020204" pitchFamily="34" charset="0"/>
-                <a:cs typeface="Arial" panose="020B0604020202020204" pitchFamily="34" charset="0"/>
-              </a:rPr>
-              <a:t>In every case, parameter recovery was highly significant, however 5 environments slightly outperformed simulations with 3 and 4 conditions. </a:t>
-            </a:r>
-          </a:p>
-          <a:p>
-            <a:pPr algn="just"/>
-            <a:endParaRPr lang="en-US" sz="1600" dirty="0">
-              <a:latin typeface="Arial" panose="020B0604020202020204" pitchFamily="34" charset="0"/>
-              <a:cs typeface="Arial" panose="020B0604020202020204" pitchFamily="34" charset="0"/>
-            </a:endParaRPr>
-          </a:p>
-          <a:p>
-            <a:pPr algn="just"/>
-            <a:r>
-              <a:rPr lang="en-US" sz="1600" dirty="0" smtClean="0">
-                <a:latin typeface="Arial" panose="020B0604020202020204" pitchFamily="34" charset="0"/>
-                <a:cs typeface="Arial" panose="020B0604020202020204" pitchFamily="34" charset="0"/>
-              </a:rPr>
-              <a:t>There was no difference in model identifiability</a:t>
-            </a:r>
-            <a:r>
-              <a:rPr lang="en-US" sz="1600" dirty="0" smtClean="0">
-                <a:latin typeface="Arial" panose="020B0604020202020204" pitchFamily="34" charset="0"/>
-                <a:cs typeface="Arial" panose="020B0604020202020204" pitchFamily="34" charset="0"/>
-              </a:rPr>
-              <a:t>.</a:t>
-            </a:r>
-          </a:p>
-          <a:p>
-            <a:pPr algn="just"/>
-            <a:endParaRPr lang="en-US" sz="1600" dirty="0">
-              <a:latin typeface="Arial" panose="020B0604020202020204" pitchFamily="34" charset="0"/>
-              <a:cs typeface="Arial" panose="020B0604020202020204" pitchFamily="34" charset="0"/>
-            </a:endParaRPr>
-          </a:p>
-          <a:p>
-            <a:pPr algn="just"/>
-            <a:r>
-              <a:rPr lang="en-US" sz="1600" dirty="0" smtClean="0">
-                <a:latin typeface="Arial" panose="020B0604020202020204" pitchFamily="34" charset="0"/>
-                <a:cs typeface="Arial" panose="020B0604020202020204" pitchFamily="34" charset="0"/>
-              </a:rPr>
-              <a:t>We also ran simulations for prior estimation and found little difference between 8, 10, and 12 repetitions of each division possibility. </a:t>
-            </a:r>
-            <a:endParaRPr lang="en-US" sz="1600" dirty="0" smtClean="0">
-              <a:latin typeface="Arial" panose="020B0604020202020204" pitchFamily="34" charset="0"/>
-              <a:cs typeface="Arial" panose="020B0604020202020204" pitchFamily="34" charset="0"/>
+              <a:latin typeface="Arial" charset="0"/>
+              <a:ea typeface="Arial" charset="0"/>
+              <a:cs typeface="Arial" charset="0"/>
             </a:endParaRPr>
           </a:p>
         </p:txBody>
@@ -14187,7 +14489,7 @@
     </p:spTree>
     <p:extLst>
       <p:ext uri="{BB962C8B-B14F-4D97-AF65-F5344CB8AC3E}">
-        <p14:creationId xmlns:p14="http://schemas.microsoft.com/office/powerpoint/2010/main" val="142249718"/>
+        <p14:creationId xmlns:p14="http://schemas.microsoft.com/office/powerpoint/2010/main" val="1914438357"/>
       </p:ext>
     </p:extLst>
   </p:cSld>
@@ -19568,7 +19870,7 @@
         <p:spPr>
           <a:xfrm>
             <a:off x="98856" y="630195"/>
-            <a:ext cx="11726560" cy="5509200"/>
+            <a:ext cx="11726560" cy="6986528"/>
           </a:xfrm>
           <a:prstGeom prst="rect">
             <a:avLst/>
@@ -19591,9 +19893,73 @@
                 <a:ea typeface="Arial" charset="0"/>
                 <a:cs typeface="Arial" charset="0"/>
               </a:rPr>
-              <a:t>Our design will consist of both a within (social vs. nonsocial) and a between (known vs. unknown) manipulation. </a:t>
-            </a:r>
-            <a:endParaRPr lang="en-US" sz="1600" dirty="0" smtClean="0">
+              <a:t>We will employ a 2 (within: social vs. nonsocial) X 2 (between: known vs. unknown) design </a:t>
+            </a:r>
+            <a:r>
+              <a:rPr lang="en-US" sz="1600" dirty="0">
+                <a:latin typeface="Arial" charset="0"/>
+                <a:ea typeface="Arial" charset="0"/>
+                <a:cs typeface="Arial" charset="0"/>
+              </a:rPr>
+              <a:t>in which </a:t>
+            </a:r>
+            <a:r>
+              <a:rPr lang="en-US" sz="1600" dirty="0" smtClean="0">
+                <a:latin typeface="Arial" charset="0"/>
+                <a:ea typeface="Arial" charset="0"/>
+                <a:cs typeface="Arial" charset="0"/>
+              </a:rPr>
+              <a:t>each </a:t>
+            </a:r>
+            <a:r>
+              <a:rPr lang="en-US" sz="1600" dirty="0">
+                <a:latin typeface="Arial" charset="0"/>
+                <a:ea typeface="Arial" charset="0"/>
+                <a:cs typeface="Arial" charset="0"/>
+              </a:rPr>
+              <a:t>subject will play </a:t>
+            </a:r>
+            <a:r>
+              <a:rPr lang="en-US" sz="1600" dirty="0" smtClean="0">
+                <a:latin typeface="Arial" charset="0"/>
+                <a:ea typeface="Arial" charset="0"/>
+                <a:cs typeface="Arial" charset="0"/>
+              </a:rPr>
+              <a:t>against both real </a:t>
+            </a:r>
+            <a:r>
+              <a:rPr lang="en-US" sz="1600" dirty="0">
+                <a:latin typeface="Arial" charset="0"/>
+                <a:ea typeface="Arial" charset="0"/>
+                <a:cs typeface="Arial" charset="0"/>
+              </a:rPr>
+              <a:t>opponents </a:t>
+            </a:r>
+            <a:r>
+              <a:rPr lang="en-US" sz="1600" dirty="0" smtClean="0">
+                <a:latin typeface="Arial" charset="0"/>
+                <a:ea typeface="Arial" charset="0"/>
+                <a:cs typeface="Arial" charset="0"/>
+              </a:rPr>
+              <a:t>and computer </a:t>
+            </a:r>
+            <a:r>
+              <a:rPr lang="en-US" sz="1600" dirty="0">
+                <a:latin typeface="Arial" charset="0"/>
+                <a:ea typeface="Arial" charset="0"/>
+                <a:cs typeface="Arial" charset="0"/>
+              </a:rPr>
+              <a:t>generated lotteries. </a:t>
+            </a:r>
+            <a:r>
+              <a:rPr lang="en-US" sz="1600" dirty="0" smtClean="0">
+                <a:latin typeface="Arial" charset="0"/>
+                <a:ea typeface="Arial" charset="0"/>
+                <a:cs typeface="Arial" charset="0"/>
+              </a:rPr>
+              <a:t>Furthermore, subjects will be allocated into a “known” and an “unknown” condition (between subjects).</a:t>
+            </a:r>
+            <a:endParaRPr lang="en-US" sz="1600" dirty="0">
               <a:latin typeface="Arial" charset="0"/>
               <a:ea typeface="Arial" charset="0"/>
               <a:cs typeface="Arial" charset="0"/>
@@ -19623,7 +19989,7 @@
                 <a:ea typeface="Arial" charset="0"/>
                 <a:cs typeface="Arial" charset="0"/>
               </a:rPr>
-              <a:t>Each </a:t>
+              <a:t>In the known </a:t>
             </a:r>
             <a:r>
               <a:rPr lang="en-US" sz="1600" dirty="0" smtClean="0">
@@ -19631,13 +19997,24 @@
                 <a:ea typeface="Arial" charset="0"/>
                 <a:cs typeface="Arial" charset="0"/>
               </a:rPr>
-              <a:t>subject will play both against real opponents as well as computer generated lotteries. </a:t>
-            </a:r>
-            <a:endParaRPr lang="en-US" sz="1600" dirty="0" smtClean="0">
-              <a:latin typeface="Arial" charset="0"/>
-              <a:ea typeface="Arial" charset="0"/>
-              <a:cs typeface="Arial" charset="0"/>
-            </a:endParaRPr>
+              <a:t>condition, subjects </a:t>
+            </a:r>
+            <a:r>
+              <a:rPr lang="en-US" sz="1600" dirty="0" smtClean="0">
+                <a:latin typeface="Arial" charset="0"/>
+                <a:ea typeface="Arial" charset="0"/>
+                <a:cs typeface="Arial" charset="0"/>
+              </a:rPr>
+              <a:t>will be informed that they are playing against responders who have received different starting </a:t>
+            </a:r>
+            <a:r>
+              <a:rPr lang="en-US" sz="1600" dirty="0" smtClean="0">
+                <a:latin typeface="Arial" charset="0"/>
+                <a:ea typeface="Arial" charset="0"/>
+                <a:cs typeface="Arial" charset="0"/>
+              </a:rPr>
+              <a:t>endowments (social), and that the lotteries against which they are playing were generated from subject data in which responders started with different endowments (non-social). </a:t>
+            </a:r>
           </a:p>
           <a:p>
             <a:pPr>
@@ -19658,34 +20035,13 @@
               </a:lnSpc>
             </a:pPr>
             <a:r>
-              <a:rPr lang="en-US" sz="1600" dirty="0">
-                <a:latin typeface="Arial" charset="0"/>
-                <a:ea typeface="Arial" charset="0"/>
-                <a:cs typeface="Arial" charset="0"/>
-              </a:rPr>
-              <a:t>W</a:t>
-            </a:r>
-            <a:r>
               <a:rPr lang="en-US" sz="1600" dirty="0" smtClean="0">
                 <a:latin typeface="Arial" charset="0"/>
                 <a:ea typeface="Arial" charset="0"/>
                 <a:cs typeface="Arial" charset="0"/>
               </a:rPr>
-              <a:t>ithin </a:t>
-            </a:r>
-            <a:r>
-              <a:rPr lang="en-US" sz="1600" dirty="0" smtClean="0">
-                <a:latin typeface="Arial" charset="0"/>
-                <a:ea typeface="Arial" charset="0"/>
-                <a:cs typeface="Arial" charset="0"/>
-              </a:rPr>
-              <a:t>the social condition, half of our subjects will be informed that they are playing against responders who have received different starting endowments (known), while half of our subjects will be informed that they are playing against responders who, for no given reason, have different acceptance thresholds (unknown). </a:t>
-            </a:r>
-            <a:endParaRPr lang="en-US" sz="1600" dirty="0" smtClean="0">
-              <a:latin typeface="Arial" charset="0"/>
-              <a:ea typeface="Arial" charset="0"/>
-              <a:cs typeface="Arial" charset="0"/>
-            </a:endParaRPr>
+              <a:t>In the unknown condition, subjects will be told only that the symbols represent different groups of responders (social) and that the symbols represent algorithms programmed to mimic the behavior of said groups (non-social). </a:t>
+            </a:r>
           </a:p>
           <a:p>
             <a:pPr>
@@ -19705,46 +20061,11 @@
                 <a:spcPct val="200000"/>
               </a:lnSpc>
             </a:pPr>
-            <a:r>
-              <a:rPr lang="en-US" sz="1600" dirty="0">
-                <a:latin typeface="Arial" charset="0"/>
-                <a:ea typeface="Arial" charset="0"/>
-                <a:cs typeface="Arial" charset="0"/>
-              </a:rPr>
-              <a:t>In each of these conditions, the resistance points of </a:t>
-            </a:r>
-            <a:r>
-              <a:rPr lang="en-US" sz="1600" b="1" i="1" dirty="0">
-                <a:latin typeface="Arial" charset="0"/>
-                <a:ea typeface="Arial" charset="0"/>
-                <a:cs typeface="Arial" charset="0"/>
-              </a:rPr>
-              <a:t>R</a:t>
-            </a:r>
-            <a:r>
-              <a:rPr lang="en-US" sz="1600" dirty="0">
-                <a:latin typeface="Arial" charset="0"/>
-                <a:ea typeface="Arial" charset="0"/>
-                <a:cs typeface="Arial" charset="0"/>
-              </a:rPr>
-              <a:t> will be identical, and must be learned by </a:t>
-            </a:r>
-            <a:r>
-              <a:rPr lang="en-US" sz="1600" b="1" i="1" dirty="0">
-                <a:latin typeface="Arial" charset="0"/>
-                <a:ea typeface="Arial" charset="0"/>
-                <a:cs typeface="Arial" charset="0"/>
-              </a:rPr>
-              <a:t>P</a:t>
-            </a:r>
-            <a:r>
-              <a:rPr lang="en-US" sz="1600" dirty="0">
-                <a:latin typeface="Arial" charset="0"/>
-                <a:ea typeface="Arial" charset="0"/>
-                <a:cs typeface="Arial" charset="0"/>
-              </a:rPr>
-              <a:t> through trial and error. </a:t>
-            </a:r>
+            <a:endParaRPr lang="en-US" sz="1600" dirty="0">
+              <a:latin typeface="Arial" charset="0"/>
+              <a:ea typeface="Arial" charset="0"/>
+              <a:cs typeface="Arial" charset="0"/>
+            </a:endParaRPr>
           </a:p>
           <a:p>
             <a:pPr>
@@ -19856,7 +20177,7 @@
         <p:spPr>
           <a:xfrm>
             <a:off x="98856" y="630195"/>
-            <a:ext cx="11726560" cy="3046988"/>
+            <a:ext cx="11726560" cy="4031873"/>
           </a:xfrm>
           <a:prstGeom prst="rect">
             <a:avLst/>
@@ -19874,6 +20195,65 @@
               </a:lnSpc>
             </a:pPr>
             <a:r>
+              <a:rPr lang="en-US" sz="1600" dirty="0">
+                <a:latin typeface="Arial" charset="0"/>
+                <a:ea typeface="Arial" charset="0"/>
+                <a:cs typeface="Arial" charset="0"/>
+              </a:rPr>
+              <a:t>In each of these conditions, the resistance points of </a:t>
+            </a:r>
+            <a:r>
+              <a:rPr lang="en-US" sz="1600" b="1" i="1" dirty="0">
+                <a:latin typeface="Arial" charset="0"/>
+                <a:ea typeface="Arial" charset="0"/>
+                <a:cs typeface="Arial" charset="0"/>
+              </a:rPr>
+              <a:t>R</a:t>
+            </a:r>
+            <a:r>
+              <a:rPr lang="en-US" sz="1600" dirty="0">
+                <a:latin typeface="Arial" charset="0"/>
+                <a:ea typeface="Arial" charset="0"/>
+                <a:cs typeface="Arial" charset="0"/>
+              </a:rPr>
+              <a:t> will be identical, and must be learned by </a:t>
+            </a:r>
+            <a:r>
+              <a:rPr lang="en-US" sz="1600" b="1" i="1" dirty="0">
+                <a:latin typeface="Arial" charset="0"/>
+                <a:ea typeface="Arial" charset="0"/>
+                <a:cs typeface="Arial" charset="0"/>
+              </a:rPr>
+              <a:t>P</a:t>
+            </a:r>
+            <a:r>
+              <a:rPr lang="en-US" sz="1600" dirty="0">
+                <a:latin typeface="Arial" charset="0"/>
+                <a:ea typeface="Arial" charset="0"/>
+                <a:cs typeface="Arial" charset="0"/>
+              </a:rPr>
+              <a:t> through trial and error. </a:t>
+            </a:r>
+          </a:p>
+          <a:p>
+            <a:pPr>
+              <a:lnSpc>
+                <a:spcPct val="200000"/>
+              </a:lnSpc>
+            </a:pPr>
+            <a:endParaRPr lang="en-US" sz="1600" dirty="0" smtClean="0">
+              <a:latin typeface="Arial" charset="0"/>
+              <a:ea typeface="Arial" charset="0"/>
+              <a:cs typeface="Arial" charset="0"/>
+            </a:endParaRPr>
+          </a:p>
+          <a:p>
+            <a:pPr>
+              <a:lnSpc>
+                <a:spcPct val="200000"/>
+              </a:lnSpc>
+            </a:pPr>
+            <a:r>
               <a:rPr lang="en-US" sz="1600" dirty="0" smtClean="0">
                 <a:latin typeface="Arial" charset="0"/>
                 <a:ea typeface="Arial" charset="0"/>
@@ -19887,7 +20267,7 @@
                 <a:ea typeface="Arial" charset="0"/>
                 <a:cs typeface="Arial" charset="0"/>
               </a:rPr>
-              <a:t>, in the known condition (where subjects know the reason for the different thresholds), subjects will be aware that the fairness norm </a:t>
+              <a:t>, in the </a:t>
             </a:r>
             <a:r>
               <a:rPr lang="en-US" sz="1600" dirty="0" smtClean="0">
@@ -19895,6 +20275,22 @@
                 <a:ea typeface="Arial" charset="0"/>
                 <a:cs typeface="Arial" charset="0"/>
               </a:rPr>
+              <a:t>social-known </a:t>
+            </a:r>
+            <a:r>
+              <a:rPr lang="en-US" sz="1600" dirty="0" smtClean="0">
+                <a:latin typeface="Arial" charset="0"/>
+                <a:ea typeface="Arial" charset="0"/>
+                <a:cs typeface="Arial" charset="0"/>
+              </a:rPr>
+              <a:t>condition (where subjects know the reason for the different thresholds), subjects will be aware that the fairness norm </a:t>
+            </a:r>
+            <a:r>
+              <a:rPr lang="en-US" sz="1600" dirty="0" smtClean="0">
+                <a:latin typeface="Arial" charset="0"/>
+                <a:ea typeface="Arial" charset="0"/>
+                <a:cs typeface="Arial" charset="0"/>
+              </a:rPr>
               <a:t>is not violated by low </a:t>
             </a:r>
             <a:r>
@@ -19903,7 +20299,23 @@
                 <a:ea typeface="Arial" charset="0"/>
                 <a:cs typeface="Arial" charset="0"/>
               </a:rPr>
-              <a:t>offers, while in the unknown condition this fact is never made explicit. </a:t>
+              <a:t>offers, while in the </a:t>
+            </a:r>
+            <a:r>
+              <a:rPr lang="en-US" sz="1600" dirty="0" smtClean="0">
+                <a:latin typeface="Arial" charset="0"/>
+                <a:ea typeface="Arial" charset="0"/>
+                <a:cs typeface="Arial" charset="0"/>
+              </a:rPr>
+              <a:t>social-unknown </a:t>
+            </a:r>
+            <a:r>
+              <a:rPr lang="en-US" sz="1600" dirty="0" smtClean="0">
+                <a:latin typeface="Arial" charset="0"/>
+                <a:ea typeface="Arial" charset="0"/>
+                <a:cs typeface="Arial" charset="0"/>
+              </a:rPr>
+              <a:t>condition this fact is never made explicit. </a:t>
             </a:r>
             <a:endParaRPr lang="en-US" sz="1600" dirty="0" smtClean="0">
               <a:latin typeface="Arial" charset="0"/>
@@ -19943,7 +20355,23 @@
                 <a:ea typeface="Arial" charset="0"/>
                 <a:cs typeface="Arial" charset="0"/>
               </a:rPr>
-              <a:t>, in the known condition, subjects could explore the full acceptance range in an attempt either </a:t>
+              <a:t>, in the </a:t>
+            </a:r>
+            <a:r>
+              <a:rPr lang="en-US" sz="1600" dirty="0" smtClean="0">
+                <a:latin typeface="Arial" charset="0"/>
+                <a:ea typeface="Arial" charset="0"/>
+                <a:cs typeface="Arial" charset="0"/>
+              </a:rPr>
+              <a:t>social-known </a:t>
+            </a:r>
+            <a:r>
+              <a:rPr lang="en-US" sz="1600" dirty="0" smtClean="0">
+                <a:latin typeface="Arial" charset="0"/>
+                <a:ea typeface="Arial" charset="0"/>
+                <a:cs typeface="Arial" charset="0"/>
+              </a:rPr>
+              <a:t>condition, subjects could explore the full acceptance range in an attempt either </a:t>
             </a:r>
             <a:r>
               <a:rPr lang="en-US" sz="1600" dirty="0" smtClean="0">

</xml_diff>

<commit_message>
working with VBA on PPG
</commit_message>
<xml_diff>
--- a/reports/Design_presentation.pptx
+++ b/reports/Design_presentation.pptx
@@ -5,7 +5,7 @@
     <p:sldMasterId id="2147483648" r:id="rId1"/>
   </p:sldMasterIdLst>
   <p:notesMasterIdLst>
-    <p:notesMasterId r:id="rId21"/>
+    <p:notesMasterId r:id="rId22"/>
   </p:notesMasterIdLst>
   <p:sldIdLst>
     <p:sldId id="265" r:id="rId2"/>
@@ -27,6 +27,7 @@
     <p:sldId id="259" r:id="rId18"/>
     <p:sldId id="284" r:id="rId19"/>
     <p:sldId id="285" r:id="rId20"/>
+    <p:sldId id="286" r:id="rId21"/>
   </p:sldIdLst>
   <p:sldSz cx="12192000" cy="6858000"/>
   <p:notesSz cx="6858000" cy="9144000"/>
@@ -12657,7 +12658,7 @@
         <p:spPr>
           <a:xfrm>
             <a:off x="182436" y="138376"/>
-            <a:ext cx="6614874" cy="2339102"/>
+            <a:ext cx="6614874" cy="2092881"/>
           </a:xfrm>
           <a:prstGeom prst="rect">
             <a:avLst/>
@@ -12721,7 +12722,7 @@
                 <a:latin typeface="Arial" panose="020B0604020202020204" pitchFamily="34" charset="0"/>
                 <a:cs typeface="Arial" panose="020B0604020202020204" pitchFamily="34" charset="0"/>
               </a:rPr>
-              <a:t>a priori beliefs about responders</a:t>
+              <a:t>a priori beliefs about what offers will be accepted </a:t>
             </a:r>
             <a:endParaRPr lang="en-US" sz="1600" dirty="0">
               <a:latin typeface="Arial" panose="020B0604020202020204" pitchFamily="34" charset="0"/>
@@ -12742,7 +12743,7 @@
                 <a:latin typeface="Arial" panose="020B0604020202020204" pitchFamily="34" charset="0"/>
                 <a:cs typeface="Arial" panose="020B0604020202020204" pitchFamily="34" charset="0"/>
               </a:rPr>
-              <a:t>Ask proposers whether or not every possible division of their endowment will be accepted by the responder</a:t>
+              <a:t>Ask proposers to make choices between two possible offers</a:t>
             </a:r>
             <a:endParaRPr lang="en-US" sz="1600" dirty="0">
               <a:latin typeface="Arial" panose="020B0604020202020204" pitchFamily="34" charset="0"/>
@@ -12790,7 +12791,7 @@
         </p:nvSpPr>
         <p:spPr>
           <a:xfrm>
-            <a:off x="419139" y="2261490"/>
+            <a:off x="419139" y="1827150"/>
             <a:ext cx="3442036" cy="2055379"/>
           </a:xfrm>
           <a:prstGeom prst="rect">
@@ -12843,8 +12844,8 @@
         </p:nvSpPr>
         <p:spPr>
           <a:xfrm>
-            <a:off x="402754" y="2279858"/>
-            <a:ext cx="3529977" cy="523220"/>
+            <a:off x="551344" y="1959818"/>
+            <a:ext cx="3529977" cy="307777"/>
           </a:xfrm>
           <a:prstGeom prst="rect">
             <a:avLst/>
@@ -12862,7 +12863,7 @@
                 <a:latin typeface="Arial" panose="020B0604020202020204" pitchFamily="34" charset="0"/>
                 <a:cs typeface="Arial" panose="020B0604020202020204" pitchFamily="34" charset="0"/>
               </a:rPr>
-              <a:t>Will the responder accept the following division of your endowment?</a:t>
+              <a:t>Choose one of the following offers</a:t>
             </a:r>
             <a:endParaRPr lang="en-US" sz="1400" dirty="0" smtClean="0">
               <a:latin typeface="Arial" panose="020B0604020202020204" pitchFamily="34" charset="0"/>
@@ -12879,8 +12880,8 @@
         </p:nvSpPr>
         <p:spPr>
           <a:xfrm>
-            <a:off x="702789" y="2892723"/>
-            <a:ext cx="3035733" cy="738664"/>
+            <a:off x="1353623" y="2724186"/>
+            <a:ext cx="2281118" cy="369332"/>
           </a:xfrm>
           <a:prstGeom prst="rect">
             <a:avLst/>
@@ -12894,54 +12895,20 @@
           <a:lstStyle/>
           <a:p>
             <a:r>
-              <a:rPr lang="en-US" sz="1400" b="1" dirty="0">
-                <a:solidFill>
-                  <a:srgbClr val="3203FF"/>
-                </a:solidFill>
-                <a:latin typeface="Arial" panose="020B0604020202020204" pitchFamily="34" charset="0"/>
-                <a:cs typeface="Arial" panose="020B0604020202020204" pitchFamily="34" charset="0"/>
-              </a:rPr>
-              <a:t>Y</a:t>
-            </a:r>
-            <a:r>
-              <a:rPr lang="en-US" sz="1400" b="1" dirty="0" smtClean="0">
-                <a:solidFill>
-                  <a:srgbClr val="3203FF"/>
-                </a:solidFill>
-                <a:latin typeface="Arial" panose="020B0604020202020204" pitchFamily="34" charset="0"/>
-                <a:cs typeface="Arial" panose="020B0604020202020204" pitchFamily="34" charset="0"/>
-              </a:rPr>
-              <a:t>ou</a:t>
-            </a:r>
-            <a:r>
-              <a:rPr lang="en-US" sz="1400" b="1" dirty="0" smtClean="0">
-                <a:latin typeface="Arial" panose="020B0604020202020204" pitchFamily="34" charset="0"/>
-                <a:cs typeface="Arial" panose="020B0604020202020204" pitchFamily="34" charset="0"/>
-              </a:rPr>
-              <a:t>: 	     20</a:t>
-            </a:r>
-          </a:p>
-          <a:p>
-            <a:r>
-              <a:rPr lang="en-US" sz="1400" b="1" dirty="0" smtClean="0">
-                <a:solidFill>
-                  <a:srgbClr val="FF0000"/>
-                </a:solidFill>
-                <a:latin typeface="Arial" panose="020B0604020202020204" pitchFamily="34" charset="0"/>
-                <a:cs typeface="Arial" panose="020B0604020202020204" pitchFamily="34" charset="0"/>
-              </a:rPr>
-              <a:t>Responder</a:t>
-            </a:r>
-            <a:r>
-              <a:rPr lang="en-US" sz="1400" b="1" dirty="0" smtClean="0">
-                <a:latin typeface="Arial" panose="020B0604020202020204" pitchFamily="34" charset="0"/>
-                <a:cs typeface="Arial" panose="020B0604020202020204" pitchFamily="34" charset="0"/>
-              </a:rPr>
-              <a:t>:     0 </a:t>
-            </a:r>
-          </a:p>
-          <a:p>
-            <a:endParaRPr lang="en-US" sz="1400" dirty="0" smtClean="0">
+              <a:rPr lang="en-US" b="1" dirty="0" smtClean="0">
+                <a:latin typeface="Arial" panose="020B0604020202020204" pitchFamily="34" charset="0"/>
+                <a:cs typeface="Arial" panose="020B0604020202020204" pitchFamily="34" charset="0"/>
+              </a:rPr>
+              <a:t>0 </a:t>
+            </a:r>
+            <a:r>
+              <a:rPr lang="en-US" b="1" smtClean="0">
+                <a:latin typeface="Arial" panose="020B0604020202020204" pitchFamily="34" charset="0"/>
+                <a:cs typeface="Arial" panose="020B0604020202020204" pitchFamily="34" charset="0"/>
+              </a:rPr>
+              <a:t>	     4</a:t>
+            </a:r>
+            <a:endParaRPr lang="en-US" b="1" dirty="0" smtClean="0">
               <a:latin typeface="Arial" panose="020B0604020202020204" pitchFamily="34" charset="0"/>
               <a:cs typeface="Arial" panose="020B0604020202020204" pitchFamily="34" charset="0"/>
             </a:endParaRPr>
@@ -12957,7 +12924,7 @@
         <p:spPr>
           <a:xfrm>
             <a:off x="320001" y="4742962"/>
-            <a:ext cx="11871999" cy="2031325"/>
+            <a:ext cx="11871999" cy="1754326"/>
           </a:xfrm>
           <a:prstGeom prst="rect">
             <a:avLst/>
@@ -12972,7 +12939,7 @@
           <a:p>
             <a:r>
               <a:rPr lang="en-US" dirty="0" smtClean="0"/>
-              <a:t>These plots depict 40 simulated subjects making 210 decisions (every possible proposal, each repeated 10 times) as to whether the responder would accept or reject the proposed division. The top row depicts parameters estimated from </a:t>
+              <a:t>These plots depict 40 simulated subjects making 100 different binary choices. The top row depicts parameters estimated from </a:t>
             </a:r>
             <a:r>
               <a:rPr lang="en-US" dirty="0" smtClean="0">
@@ -13022,7 +12989,35 @@
                 <a:latin typeface="Arial" panose="020B0604020202020204" pitchFamily="34" charset="0"/>
                 <a:cs typeface="Arial" panose="020B0604020202020204" pitchFamily="34" charset="0"/>
               </a:rPr>
-              <a:t>If we estimate each trial taking 2 seconds, with no ISI, then prior estimation should take 7 minutes. </a:t>
+              <a:t>If we estimate each trial </a:t>
+            </a:r>
+            <a:r>
+              <a:rPr lang="en-US" smtClean="0">
+                <a:latin typeface="Arial" panose="020B0604020202020204" pitchFamily="34" charset="0"/>
+                <a:cs typeface="Arial" panose="020B0604020202020204" pitchFamily="34" charset="0"/>
+              </a:rPr>
+              <a:t>taking 3.5 </a:t>
+            </a:r>
+            <a:r>
+              <a:rPr lang="en-US" dirty="0" smtClean="0">
+                <a:latin typeface="Arial" panose="020B0604020202020204" pitchFamily="34" charset="0"/>
+                <a:cs typeface="Arial" panose="020B0604020202020204" pitchFamily="34" charset="0"/>
+              </a:rPr>
+              <a:t>seconds, with no ISI, then prior estimation </a:t>
+            </a:r>
+            <a:r>
+              <a:rPr lang="en-US" smtClean="0">
+                <a:latin typeface="Arial" panose="020B0604020202020204" pitchFamily="34" charset="0"/>
+                <a:cs typeface="Arial" panose="020B0604020202020204" pitchFamily="34" charset="0"/>
+              </a:rPr>
+              <a:t>should take 5.8 </a:t>
+            </a:r>
+            <a:r>
+              <a:rPr lang="en-US" dirty="0" smtClean="0">
+                <a:latin typeface="Arial" panose="020B0604020202020204" pitchFamily="34" charset="0"/>
+                <a:cs typeface="Arial" panose="020B0604020202020204" pitchFamily="34" charset="0"/>
+              </a:rPr>
+              <a:t>minutes. </a:t>
             </a:r>
           </a:p>
           <a:p>
@@ -13043,43 +13038,9 @@
           </a:p>
         </p:txBody>
       </p:sp>
-      <p:sp>
-        <p:nvSpPr>
-          <p:cNvPr id="8" name="TextBox 7"/>
-          <p:cNvSpPr txBox="1"/>
-          <p:nvPr/>
-        </p:nvSpPr>
-        <p:spPr>
-          <a:xfrm>
-            <a:off x="1464331" y="3721032"/>
-            <a:ext cx="1351652" cy="369332"/>
-          </a:xfrm>
-          <a:prstGeom prst="rect">
-            <a:avLst/>
-          </a:prstGeom>
-          <a:noFill/>
-        </p:spPr>
-        <p:txBody>
-          <a:bodyPr wrap="none" rtlCol="0">
-            <a:spAutoFit/>
-          </a:bodyPr>
-          <a:lstStyle/>
-          <a:p>
-            <a:r>
-              <a:rPr lang="en-US" dirty="0"/>
-              <a:t>y</a:t>
-            </a:r>
-            <a:r>
-              <a:rPr lang="en-US" dirty="0" smtClean="0"/>
-              <a:t>es	no</a:t>
-            </a:r>
-            <a:endParaRPr lang="en-US" dirty="0"/>
-          </a:p>
-        </p:txBody>
-      </p:sp>
       <p:pic>
         <p:nvPicPr>
-          <p:cNvPr id="9" name="Picture 8"/>
+          <p:cNvPr id="11" name="Picture 10"/>
           <p:cNvPicPr>
             <a:picLocks noChangeAspect="1"/>
           </p:cNvPicPr>
@@ -13099,8 +13060,8 @@
         </p:blipFill>
         <p:spPr>
           <a:xfrm>
-            <a:off x="6797310" y="578422"/>
-            <a:ext cx="5394690" cy="4046018"/>
+            <a:off x="6901600" y="848850"/>
+            <a:ext cx="4942796" cy="3707097"/>
           </a:xfrm>
           <a:prstGeom prst="rect">
             <a:avLst/>
@@ -13109,13 +13070,13 @@
       </p:pic>
       <p:sp>
         <p:nvSpPr>
-          <p:cNvPr id="12" name="Rectangle 11"/>
+          <p:cNvPr id="20" name="Rectangle 19"/>
           <p:cNvSpPr/>
           <p:nvPr/>
         </p:nvSpPr>
         <p:spPr>
           <a:xfrm>
-            <a:off x="3104357" y="2647048"/>
+            <a:off x="3173608" y="2400263"/>
             <a:ext cx="3442036" cy="2055379"/>
           </a:xfrm>
           <a:prstGeom prst="rect">
@@ -13162,14 +13123,14 @@
       </p:sp>
       <p:sp>
         <p:nvSpPr>
-          <p:cNvPr id="14" name="TextBox 13"/>
+          <p:cNvPr id="21" name="TextBox 20"/>
           <p:cNvSpPr txBox="1"/>
           <p:nvPr/>
         </p:nvSpPr>
         <p:spPr>
           <a:xfrm>
-            <a:off x="3087972" y="2665416"/>
-            <a:ext cx="3529977" cy="523220"/>
+            <a:off x="3305813" y="2532931"/>
+            <a:ext cx="3529977" cy="307777"/>
           </a:xfrm>
           <a:prstGeom prst="rect">
             <a:avLst/>
@@ -13187,7 +13148,7 @@
                 <a:latin typeface="Arial" panose="020B0604020202020204" pitchFamily="34" charset="0"/>
                 <a:cs typeface="Arial" panose="020B0604020202020204" pitchFamily="34" charset="0"/>
               </a:rPr>
-              <a:t>Will the responder accept the following division of your endowment?</a:t>
+              <a:t>Choose one of the following offers</a:t>
             </a:r>
             <a:endParaRPr lang="en-US" sz="1400" dirty="0" smtClean="0">
               <a:latin typeface="Arial" panose="020B0604020202020204" pitchFamily="34" charset="0"/>
@@ -13198,14 +13159,14 @@
       </p:sp>
       <p:sp>
         <p:nvSpPr>
-          <p:cNvPr id="15" name="TextBox 14"/>
+          <p:cNvPr id="22" name="TextBox 21"/>
           <p:cNvSpPr txBox="1"/>
           <p:nvPr/>
         </p:nvSpPr>
         <p:spPr>
           <a:xfrm>
-            <a:off x="3388007" y="3278281"/>
-            <a:ext cx="3035733" cy="738664"/>
+            <a:off x="4108092" y="3297299"/>
+            <a:ext cx="2281118" cy="369332"/>
           </a:xfrm>
           <a:prstGeom prst="rect">
             <a:avLst/>
@@ -13219,91 +13180,19 @@
           <a:lstStyle/>
           <a:p>
             <a:r>
-              <a:rPr lang="en-US" sz="1400" b="1" dirty="0">
-                <a:solidFill>
-                  <a:srgbClr val="3203FF"/>
-                </a:solidFill>
-                <a:latin typeface="Arial" panose="020B0604020202020204" pitchFamily="34" charset="0"/>
-                <a:cs typeface="Arial" panose="020B0604020202020204" pitchFamily="34" charset="0"/>
-              </a:rPr>
-              <a:t>Y</a:t>
-            </a:r>
-            <a:r>
-              <a:rPr lang="en-US" sz="1400" b="1" dirty="0" smtClean="0">
-                <a:solidFill>
-                  <a:srgbClr val="3203FF"/>
-                </a:solidFill>
-                <a:latin typeface="Arial" panose="020B0604020202020204" pitchFamily="34" charset="0"/>
-                <a:cs typeface="Arial" panose="020B0604020202020204" pitchFamily="34" charset="0"/>
-              </a:rPr>
-              <a:t>ou</a:t>
-            </a:r>
-            <a:r>
-              <a:rPr lang="en-US" sz="1400" b="1" dirty="0" smtClean="0">
-                <a:latin typeface="Arial" panose="020B0604020202020204" pitchFamily="34" charset="0"/>
-                <a:cs typeface="Arial" panose="020B0604020202020204" pitchFamily="34" charset="0"/>
-              </a:rPr>
-              <a:t>: 	     19</a:t>
-            </a:r>
-          </a:p>
-          <a:p>
-            <a:r>
-              <a:rPr lang="en-US" sz="1400" b="1" dirty="0" smtClean="0">
-                <a:solidFill>
-                  <a:srgbClr val="FF0000"/>
-                </a:solidFill>
-                <a:latin typeface="Arial" panose="020B0604020202020204" pitchFamily="34" charset="0"/>
-                <a:cs typeface="Arial" panose="020B0604020202020204" pitchFamily="34" charset="0"/>
-              </a:rPr>
-              <a:t>Responder</a:t>
-            </a:r>
-            <a:r>
-              <a:rPr lang="en-US" sz="1400" b="1" dirty="0" smtClean="0">
-                <a:latin typeface="Arial" panose="020B0604020202020204" pitchFamily="34" charset="0"/>
-                <a:cs typeface="Arial" panose="020B0604020202020204" pitchFamily="34" charset="0"/>
-              </a:rPr>
-              <a:t>:     1 </a:t>
-            </a:r>
-          </a:p>
-          <a:p>
-            <a:endParaRPr lang="en-US" sz="1400" dirty="0" smtClean="0">
-              <a:latin typeface="Arial" panose="020B0604020202020204" pitchFamily="34" charset="0"/>
-              <a:cs typeface="Arial" panose="020B0604020202020204" pitchFamily="34" charset="0"/>
-            </a:endParaRPr>
-          </a:p>
-        </p:txBody>
-      </p:sp>
-      <p:sp>
-        <p:nvSpPr>
-          <p:cNvPr id="16" name="TextBox 15"/>
-          <p:cNvSpPr txBox="1"/>
-          <p:nvPr/>
-        </p:nvSpPr>
-        <p:spPr>
-          <a:xfrm>
-            <a:off x="4149549" y="4106590"/>
-            <a:ext cx="1351652" cy="369332"/>
-          </a:xfrm>
-          <a:prstGeom prst="rect">
-            <a:avLst/>
-          </a:prstGeom>
-          <a:noFill/>
-        </p:spPr>
-        <p:txBody>
-          <a:bodyPr wrap="none" rtlCol="0">
-            <a:spAutoFit/>
-          </a:bodyPr>
-          <a:lstStyle/>
-          <a:p>
-            <a:r>
-              <a:rPr lang="en-US" dirty="0"/>
-              <a:t>y</a:t>
-            </a:r>
-            <a:r>
-              <a:rPr lang="en-US" dirty="0" smtClean="0"/>
-              <a:t>es	no</a:t>
-            </a:r>
-            <a:endParaRPr lang="en-US" dirty="0"/>
+              <a:rPr lang="en-US" b="1" dirty="0">
+                <a:latin typeface="Arial" panose="020B0604020202020204" pitchFamily="34" charset="0"/>
+                <a:cs typeface="Arial" panose="020B0604020202020204" pitchFamily="34" charset="0"/>
+              </a:rPr>
+              <a:t>6</a:t>
+            </a:r>
+            <a:r>
+              <a:rPr lang="en-US" b="1" dirty="0" smtClean="0">
+                <a:latin typeface="Arial" panose="020B0604020202020204" pitchFamily="34" charset="0"/>
+                <a:cs typeface="Arial" panose="020B0604020202020204" pitchFamily="34" charset="0"/>
+              </a:rPr>
+              <a:t> 	     20</a:t>
+            </a:r>
           </a:p>
         </p:txBody>
       </p:sp>
@@ -14468,15 +14357,7 @@
                 <a:ea typeface="Arial" charset="0"/>
                 <a:cs typeface="Arial" charset="0"/>
               </a:rPr>
-              <a:t> I would think that if there is an order effect, non-social -&gt; social affects social, but social -&gt; non-social doesn’t </a:t>
-            </a:r>
-            <a:r>
-              <a:rPr lang="en-US" sz="1600" smtClean="0">
-                <a:latin typeface="Arial" charset="0"/>
-                <a:ea typeface="Arial" charset="0"/>
-                <a:cs typeface="Arial" charset="0"/>
-              </a:rPr>
-              <a:t>effect non-social. </a:t>
+              <a:t> I would think that if there is an order effect, non-social -&gt; social affects social, but social -&gt; non-social doesn’t effect non-social. </a:t>
             </a:r>
             <a:endParaRPr lang="en-US" sz="1600" dirty="0">
               <a:latin typeface="Arial" charset="0"/>
@@ -15566,6 +15447,144 @@
 </p:sld>
 </file>
 
+<file path=ppt/slides/slide20.xml><?xml version="1.0" encoding="utf-8"?>
+<p:sld xmlns:a="http://schemas.openxmlformats.org/drawingml/2006/main" xmlns:r="http://schemas.openxmlformats.org/officeDocument/2006/relationships" xmlns:p="http://schemas.openxmlformats.org/presentationml/2006/main">
+  <p:cSld>
+    <p:spTree>
+      <p:nvGrpSpPr>
+        <p:cNvPr id="1" name=""/>
+        <p:cNvGrpSpPr/>
+        <p:nvPr/>
+      </p:nvGrpSpPr>
+      <p:grpSpPr>
+        <a:xfrm>
+          <a:off x="0" y="0"/>
+          <a:ext cx="0" cy="0"/>
+          <a:chOff x="0" y="0"/>
+          <a:chExt cx="0" cy="0"/>
+        </a:xfrm>
+      </p:grpSpPr>
+      <p:sp>
+        <p:nvSpPr>
+          <p:cNvPr id="4" name="TextBox 3"/>
+          <p:cNvSpPr txBox="1"/>
+          <p:nvPr/>
+        </p:nvSpPr>
+        <p:spPr>
+          <a:xfrm>
+            <a:off x="145774" y="168519"/>
+            <a:ext cx="11729069" cy="1354217"/>
+          </a:xfrm>
+          <a:prstGeom prst="rect">
+            <a:avLst/>
+          </a:prstGeom>
+          <a:noFill/>
+        </p:spPr>
+        <p:txBody>
+          <a:bodyPr wrap="square" rtlCol="0">
+            <a:spAutoFit/>
+          </a:bodyPr>
+          <a:lstStyle/>
+          <a:p>
+            <a:r>
+              <a:rPr lang="en-US" b="1" dirty="0" smtClean="0">
+                <a:latin typeface="Arial" charset="0"/>
+                <a:ea typeface="Arial" charset="0"/>
+                <a:cs typeface="Arial" charset="0"/>
+              </a:rPr>
+              <a:t>Next</a:t>
+            </a:r>
+            <a:r>
+              <a:rPr lang="mr-IN" b="1" dirty="0" smtClean="0">
+                <a:latin typeface="Arial" charset="0"/>
+                <a:ea typeface="Arial" charset="0"/>
+                <a:cs typeface="Arial" charset="0"/>
+              </a:rPr>
+              <a:t>…</a:t>
+            </a:r>
+            <a:endParaRPr lang="en-US" b="1" dirty="0" smtClean="0">
+              <a:latin typeface="Arial" charset="0"/>
+              <a:ea typeface="Arial" charset="0"/>
+              <a:cs typeface="Arial" charset="0"/>
+            </a:endParaRPr>
+          </a:p>
+          <a:p>
+            <a:endParaRPr lang="en-US" sz="1600" dirty="0">
+              <a:latin typeface="Arial" panose="020B0604020202020204" pitchFamily="34" charset="0"/>
+              <a:cs typeface="Arial" panose="020B0604020202020204" pitchFamily="34" charset="0"/>
+            </a:endParaRPr>
+          </a:p>
+          <a:p>
+            <a:pPr marL="742950" lvl="1" indent="-285750">
+              <a:buFont typeface="Arial" charset="0"/>
+              <a:buChar char="•"/>
+            </a:pPr>
+            <a:r>
+              <a:rPr lang="en-US" sz="1600" dirty="0" smtClean="0">
+                <a:latin typeface="Arial" charset="0"/>
+                <a:ea typeface="Arial" charset="0"/>
+                <a:cs typeface="Arial" charset="0"/>
+              </a:rPr>
+              <a:t>Pilot the study with interleafed and block design with ~12 participants in each, and see which one fits with our predictions closer.</a:t>
+            </a:r>
+          </a:p>
+          <a:p>
+            <a:pPr marL="742950" lvl="1" indent="-285750">
+              <a:buFont typeface="Arial" charset="0"/>
+              <a:buChar char="•"/>
+            </a:pPr>
+            <a:r>
+              <a:rPr lang="en-US" sz="1600" dirty="0" smtClean="0">
+                <a:latin typeface="Arial" charset="0"/>
+                <a:ea typeface="Arial" charset="0"/>
+                <a:cs typeface="Arial" charset="0"/>
+              </a:rPr>
+              <a:t>Pre-registration with </a:t>
+            </a:r>
+            <a:r>
+              <a:rPr lang="en-US" sz="1600" i="1" dirty="0" smtClean="0">
+                <a:latin typeface="Arial" charset="0"/>
+                <a:ea typeface="Arial" charset="0"/>
+                <a:cs typeface="Arial" charset="0"/>
+              </a:rPr>
+              <a:t>As Predicted</a:t>
+            </a:r>
+            <a:r>
+              <a:rPr lang="en-US" sz="1600" dirty="0" smtClean="0">
+                <a:latin typeface="Arial" charset="0"/>
+                <a:ea typeface="Arial" charset="0"/>
+                <a:cs typeface="Arial" charset="0"/>
+              </a:rPr>
+              <a:t>?</a:t>
+            </a:r>
+            <a:endParaRPr lang="en-US" sz="1600" i="1" dirty="0">
+              <a:latin typeface="Arial" charset="0"/>
+              <a:ea typeface="Arial" charset="0"/>
+              <a:cs typeface="Arial" charset="0"/>
+            </a:endParaRPr>
+          </a:p>
+        </p:txBody>
+      </p:sp>
+    </p:spTree>
+    <p:extLst>
+      <p:ext uri="{BB962C8B-B14F-4D97-AF65-F5344CB8AC3E}">
+        <p14:creationId xmlns:p14="http://schemas.microsoft.com/office/powerpoint/2010/main" val="583224771"/>
+      </p:ext>
+    </p:extLst>
+  </p:cSld>
+  <p:clrMapOvr>
+    <a:masterClrMapping/>
+  </p:clrMapOvr>
+  <p:timing>
+    <p:tnLst>
+      <p:par>
+        <p:cTn id="1" dur="indefinite" restart="never" nodeType="tmRoot"/>
+      </p:par>
+    </p:tnLst>
+  </p:timing>
+</p:sld>
+</file>
+
 <file path=ppt/slides/slide3.xml><?xml version="1.0" encoding="utf-8"?>
 <p:sld xmlns:a="http://schemas.openxmlformats.org/drawingml/2006/main" xmlns:r="http://schemas.openxmlformats.org/officeDocument/2006/relationships" xmlns:p="http://schemas.openxmlformats.org/presentationml/2006/main">
   <p:cSld>

</xml_diff>

<commit_message>
after pilot data collection, processing data
</commit_message>
<xml_diff>
--- a/reports/Design_presentation.pptx
+++ b/reports/Design_presentation.pptx
@@ -216,7 +216,7 @@
           <a:p>
             <a:fld id="{8E2E9B87-5100-4146-9200-862C5D9958BA}" type="datetimeFigureOut">
               <a:rPr lang="en-US" smtClean="0"/>
-              <a:t>10/31/17</a:t>
+              <a:t>11/13/17</a:t>
             </a:fld>
             <a:endParaRPr lang="en-US"/>
           </a:p>
@@ -951,7 +951,7 @@
           <a:p>
             <a:fld id="{E4AE026E-8436-447E-BAF7-68AA9CBCBCC7}" type="datetimeFigureOut">
               <a:rPr lang="en-US" smtClean="0"/>
-              <a:t>10/31/17</a:t>
+              <a:t>11/13/17</a:t>
             </a:fld>
             <a:endParaRPr lang="en-US"/>
           </a:p>
@@ -1121,7 +1121,7 @@
           <a:p>
             <a:fld id="{E4AE026E-8436-447E-BAF7-68AA9CBCBCC7}" type="datetimeFigureOut">
               <a:rPr lang="en-US" smtClean="0"/>
-              <a:t>10/31/17</a:t>
+              <a:t>11/13/17</a:t>
             </a:fld>
             <a:endParaRPr lang="en-US"/>
           </a:p>
@@ -1301,7 +1301,7 @@
           <a:p>
             <a:fld id="{E4AE026E-8436-447E-BAF7-68AA9CBCBCC7}" type="datetimeFigureOut">
               <a:rPr lang="en-US" smtClean="0"/>
-              <a:t>10/31/17</a:t>
+              <a:t>11/13/17</a:t>
             </a:fld>
             <a:endParaRPr lang="en-US"/>
           </a:p>
@@ -1471,7 +1471,7 @@
           <a:p>
             <a:fld id="{E4AE026E-8436-447E-BAF7-68AA9CBCBCC7}" type="datetimeFigureOut">
               <a:rPr lang="en-US" smtClean="0"/>
-              <a:t>10/31/17</a:t>
+              <a:t>11/13/17</a:t>
             </a:fld>
             <a:endParaRPr lang="en-US"/>
           </a:p>
@@ -1717,7 +1717,7 @@
           <a:p>
             <a:fld id="{E4AE026E-8436-447E-BAF7-68AA9CBCBCC7}" type="datetimeFigureOut">
               <a:rPr lang="en-US" smtClean="0"/>
-              <a:t>10/31/17</a:t>
+              <a:t>11/13/17</a:t>
             </a:fld>
             <a:endParaRPr lang="en-US"/>
           </a:p>
@@ -1949,7 +1949,7 @@
           <a:p>
             <a:fld id="{E4AE026E-8436-447E-BAF7-68AA9CBCBCC7}" type="datetimeFigureOut">
               <a:rPr lang="en-US" smtClean="0"/>
-              <a:t>10/31/17</a:t>
+              <a:t>11/13/17</a:t>
             </a:fld>
             <a:endParaRPr lang="en-US"/>
           </a:p>
@@ -2316,7 +2316,7 @@
           <a:p>
             <a:fld id="{E4AE026E-8436-447E-BAF7-68AA9CBCBCC7}" type="datetimeFigureOut">
               <a:rPr lang="en-US" smtClean="0"/>
-              <a:t>10/31/17</a:t>
+              <a:t>11/13/17</a:t>
             </a:fld>
             <a:endParaRPr lang="en-US"/>
           </a:p>
@@ -2434,7 +2434,7 @@
           <a:p>
             <a:fld id="{E4AE026E-8436-447E-BAF7-68AA9CBCBCC7}" type="datetimeFigureOut">
               <a:rPr lang="en-US" smtClean="0"/>
-              <a:t>10/31/17</a:t>
+              <a:t>11/13/17</a:t>
             </a:fld>
             <a:endParaRPr lang="en-US"/>
           </a:p>
@@ -2529,7 +2529,7 @@
           <a:p>
             <a:fld id="{E4AE026E-8436-447E-BAF7-68AA9CBCBCC7}" type="datetimeFigureOut">
               <a:rPr lang="en-US" smtClean="0"/>
-              <a:t>10/31/17</a:t>
+              <a:t>11/13/17</a:t>
             </a:fld>
             <a:endParaRPr lang="en-US"/>
           </a:p>
@@ -2806,7 +2806,7 @@
           <a:p>
             <a:fld id="{E4AE026E-8436-447E-BAF7-68AA9CBCBCC7}" type="datetimeFigureOut">
               <a:rPr lang="en-US" smtClean="0"/>
-              <a:t>10/31/17</a:t>
+              <a:t>11/13/17</a:t>
             </a:fld>
             <a:endParaRPr lang="en-US"/>
           </a:p>
@@ -3059,7 +3059,7 @@
           <a:p>
             <a:fld id="{E4AE026E-8436-447E-BAF7-68AA9CBCBCC7}" type="datetimeFigureOut">
               <a:rPr lang="en-US" smtClean="0"/>
-              <a:t>10/31/17</a:t>
+              <a:t>11/13/17</a:t>
             </a:fld>
             <a:endParaRPr lang="en-US"/>
           </a:p>
@@ -3272,7 +3272,7 @@
           <a:p>
             <a:fld id="{E4AE026E-8436-447E-BAF7-68AA9CBCBCC7}" type="datetimeFigureOut">
               <a:rPr lang="en-US" smtClean="0"/>
-              <a:t>10/31/17</a:t>
+              <a:t>11/13/17</a:t>
             </a:fld>
             <a:endParaRPr lang="en-US"/>
           </a:p>
@@ -4000,14 +4000,7 @@
                 <a:latin typeface="Arial" panose="020B0604020202020204" pitchFamily="34" charset="0"/>
                 <a:cs typeface="Arial" panose="020B0604020202020204" pitchFamily="34" charset="0"/>
               </a:rPr>
-              <a:t> </a:t>
-            </a:r>
-            <a:r>
-              <a:rPr lang="en-US" sz="1400" b="1" dirty="0" smtClean="0">
-                <a:latin typeface="Arial" panose="020B0604020202020204" pitchFamily="34" charset="0"/>
-                <a:cs typeface="Arial" panose="020B0604020202020204" pitchFamily="34" charset="0"/>
-              </a:rPr>
-              <a:t>Scenarios/Environments: </a:t>
+              <a:t> Scenarios/Environments: </a:t>
             </a:r>
           </a:p>
           <a:p>
@@ -4755,28 +4748,7 @@
                 <a:latin typeface="Arial" panose="020B0604020202020204" pitchFamily="34" charset="0"/>
                 <a:cs typeface="Arial" panose="020B0604020202020204" pitchFamily="34" charset="0"/>
               </a:rPr>
-              <a:t>This generated different acceptance functions of the responders, </a:t>
-            </a:r>
-            <a:r>
-              <a:rPr lang="en-US" sz="1600" dirty="0" smtClean="0">
-                <a:latin typeface="Arial" panose="020B0604020202020204" pitchFamily="34" charset="0"/>
-                <a:cs typeface="Arial" panose="020B0604020202020204" pitchFamily="34" charset="0"/>
-              </a:rPr>
-              <a:t>with </a:t>
-            </a:r>
-            <a:r>
-              <a:rPr lang="en-US" sz="1600" dirty="0" smtClean="0">
-                <a:latin typeface="Arial" panose="020B0604020202020204" pitchFamily="34" charset="0"/>
-                <a:cs typeface="Arial" panose="020B0604020202020204" pitchFamily="34" charset="0"/>
-              </a:rPr>
-              <a:t>higher starting endowments creating lower resistance </a:t>
-            </a:r>
-            <a:r>
-              <a:rPr lang="en-US" sz="1600" dirty="0" smtClean="0">
-                <a:latin typeface="Arial" panose="020B0604020202020204" pitchFamily="34" charset="0"/>
-                <a:cs typeface="Arial" panose="020B0604020202020204" pitchFamily="34" charset="0"/>
-              </a:rPr>
-              <a:t>points.</a:t>
+              <a:t>This generated different acceptance functions of the responders, with higher starting endowments creating lower resistance points.</a:t>
             </a:r>
           </a:p>
           <a:p>
@@ -5149,19 +5121,8 @@
                 <a:latin typeface="Arial" panose="020B0604020202020204" pitchFamily="34" charset="0"/>
                 <a:cs typeface="Arial" panose="020B0604020202020204" pitchFamily="34" charset="0"/>
               </a:rPr>
-              <a:t> </a:t>
-            </a:r>
-            <a:r>
-              <a:rPr lang="en-US" sz="1400" dirty="0" smtClean="0">
-                <a:latin typeface="Arial" panose="020B0604020202020204" pitchFamily="34" charset="0"/>
-                <a:cs typeface="Arial" panose="020B0604020202020204" pitchFamily="34" charset="0"/>
-              </a:rPr>
-              <a:t>is represented by different symbols</a:t>
-            </a:r>
-            <a:endParaRPr lang="en-US" sz="1400" dirty="0" smtClean="0">
-              <a:latin typeface="Arial" panose="020B0604020202020204" pitchFamily="34" charset="0"/>
-              <a:cs typeface="Arial" panose="020B0604020202020204" pitchFamily="34" charset="0"/>
-            </a:endParaRPr>
+              <a:t> is represented by different symbols</a:t>
+            </a:r>
           </a:p>
           <a:p>
             <a:endParaRPr lang="en-US" sz="1400" dirty="0" smtClean="0">
@@ -8103,14 +8064,7 @@
                   <a:latin typeface="Arial" panose="020B0604020202020204" pitchFamily="34" charset="0"/>
                   <a:cs typeface="Arial" panose="020B0604020202020204" pitchFamily="34" charset="0"/>
                 </a:rPr>
-                <a:t>        </a:t>
-              </a:r>
-              <a:r>
-                <a:rPr lang="en-US" sz="1200" dirty="0" smtClean="0">
-                  <a:latin typeface="Arial" panose="020B0604020202020204" pitchFamily="34" charset="0"/>
-                  <a:cs typeface="Arial" panose="020B0604020202020204" pitchFamily="34" charset="0"/>
-                </a:rPr>
-                <a:t>= €13</a:t>
+                <a:t>        = €13</a:t>
               </a:r>
               <a:endParaRPr lang="en-US" sz="1200" dirty="0">
                 <a:latin typeface="Arial" panose="020B0604020202020204" pitchFamily="34" charset="0"/>
@@ -8824,21 +8778,7 @@
                 <a:latin typeface="Arial" panose="020B0604020202020204" pitchFamily="34" charset="0"/>
                 <a:cs typeface="Arial" panose="020B0604020202020204" pitchFamily="34" charset="0"/>
               </a:rPr>
-              <a:t>As feedback, we use the </a:t>
-            </a:r>
-            <a:r>
-              <a:rPr lang="en-US" sz="1200" i="1" dirty="0" smtClean="0">
-                <a:latin typeface="Arial" panose="020B0604020202020204" pitchFamily="34" charset="0"/>
-                <a:cs typeface="Arial" panose="020B0604020202020204" pitchFamily="34" charset="0"/>
-              </a:rPr>
-              <a:t>probability distributions taken from behavior </a:t>
-            </a:r>
-            <a:r>
-              <a:rPr lang="en-US" sz="1200" i="1" dirty="0" smtClean="0">
-                <a:latin typeface="Arial" panose="020B0604020202020204" pitchFamily="34" charset="0"/>
-                <a:cs typeface="Arial" panose="020B0604020202020204" pitchFamily="34" charset="0"/>
-              </a:rPr>
-              <a:t>from step 1</a:t>
+              <a:t>As feedback, we use the probability distributions taken from behavior from step 1</a:t>
             </a:r>
             <a:endParaRPr lang="en-US" sz="1200" dirty="0" smtClean="0">
               <a:latin typeface="Arial" panose="020B0604020202020204" pitchFamily="34" charset="0"/>
@@ -11266,14 +11206,7 @@
                   <a:latin typeface="Arial" panose="020B0604020202020204" pitchFamily="34" charset="0"/>
                   <a:cs typeface="Arial" panose="020B0604020202020204" pitchFamily="34" charset="0"/>
                 </a:rPr>
-                <a:t>        </a:t>
-              </a:r>
-              <a:r>
-                <a:rPr lang="en-US" sz="1200" dirty="0" smtClean="0">
-                  <a:latin typeface="Arial" panose="020B0604020202020204" pitchFamily="34" charset="0"/>
-                  <a:cs typeface="Arial" panose="020B0604020202020204" pitchFamily="34" charset="0"/>
-                </a:rPr>
-                <a:t>= €13</a:t>
+                <a:t>        = €13</a:t>
               </a:r>
               <a:endParaRPr lang="en-US" sz="1200" dirty="0">
                 <a:latin typeface="Arial" panose="020B0604020202020204" pitchFamily="34" charset="0"/>
@@ -11418,21 +11351,7 @@
                 <a:latin typeface="Arial" panose="020B0604020202020204" pitchFamily="34" charset="0"/>
                 <a:cs typeface="Arial" panose="020B0604020202020204" pitchFamily="34" charset="0"/>
               </a:rPr>
-              <a:t>Phase </a:t>
-            </a:r>
-            <a:r>
-              <a:rPr lang="en-US" b="1" dirty="0" smtClean="0">
-                <a:latin typeface="Arial" panose="020B0604020202020204" pitchFamily="34" charset="0"/>
-                <a:cs typeface="Arial" panose="020B0604020202020204" pitchFamily="34" charset="0"/>
-              </a:rPr>
-              <a:t>2c/d: </a:t>
-            </a:r>
-            <a:r>
-              <a:rPr lang="en-US" b="1" dirty="0" smtClean="0">
-                <a:latin typeface="Arial" panose="020B0604020202020204" pitchFamily="34" charset="0"/>
-                <a:cs typeface="Arial" panose="020B0604020202020204" pitchFamily="34" charset="0"/>
-              </a:rPr>
-              <a:t>social norms VS maximizing reward.</a:t>
+              <a:t>Phase 2c/d: social norms VS maximizing reward.</a:t>
             </a:r>
             <a:endParaRPr lang="en-US" b="1" dirty="0">
               <a:latin typeface="Arial" panose="020B0604020202020204" pitchFamily="34" charset="0"/>
@@ -12400,6 +12319,11 @@
               </a:rPr>
               <a:t>game</a:t>
             </a:r>
+            <a:endParaRPr lang="en-US" sz="1600" dirty="0" smtClean="0">
+              <a:latin typeface="Arial" charset="0"/>
+              <a:ea typeface="Arial" charset="0"/>
+              <a:cs typeface="Arial" charset="0"/>
+            </a:endParaRPr>
           </a:p>
           <a:p>
             <a:pPr>
@@ -12679,10 +12603,6 @@
               </a:rPr>
               <a:t>Fitting priors</a:t>
             </a:r>
-            <a:endParaRPr lang="en-US" b="1" dirty="0" smtClean="0">
-              <a:latin typeface="Arial" panose="020B0604020202020204" pitchFamily="34" charset="0"/>
-              <a:cs typeface="Arial" panose="020B0604020202020204" pitchFamily="34" charset="0"/>
-            </a:endParaRPr>
           </a:p>
           <a:p>
             <a:pPr algn="just"/>
@@ -13583,21 +13503,7 @@
                 <a:latin typeface="Arial" panose="020B0604020202020204" pitchFamily="34" charset="0"/>
                 <a:cs typeface="Arial" panose="020B0604020202020204" pitchFamily="34" charset="0"/>
               </a:rPr>
-              <a:t>n all conditions, </a:t>
-            </a:r>
-            <a:r>
-              <a:rPr lang="en-US" sz="1600" dirty="0" smtClean="0">
-                <a:latin typeface="Arial" panose="020B0604020202020204" pitchFamily="34" charset="0"/>
-                <a:cs typeface="Arial" panose="020B0604020202020204" pitchFamily="34" charset="0"/>
-              </a:rPr>
-              <a:t>proposers </a:t>
-            </a:r>
-            <a:r>
-              <a:rPr lang="en-US" sz="1600" dirty="0" smtClean="0">
-                <a:latin typeface="Arial" panose="020B0604020202020204" pitchFamily="34" charset="0"/>
-                <a:cs typeface="Arial" panose="020B0604020202020204" pitchFamily="34" charset="0"/>
-              </a:rPr>
-              <a:t>start with a (distributional) prior about the norm, but gradually integrate feedback to update the norm and improve payoff</a:t>
+              <a:t>n all conditions, proposers start with a (distributional) prior about the norm, but gradually integrate feedback to update the norm and improve payoff</a:t>
             </a:r>
             <a:r>
               <a:rPr lang="en-US" sz="1600" dirty="0">
@@ -13639,14 +13545,7 @@
                 <a:latin typeface="Arial" panose="020B0604020202020204" pitchFamily="34" charset="0"/>
                 <a:cs typeface="Arial" panose="020B0604020202020204" pitchFamily="34" charset="0"/>
               </a:rPr>
-              <a:t>earning can be captured in an RL </a:t>
-            </a:r>
-            <a:r>
-              <a:rPr lang="en-US" sz="1600" b="1" dirty="0" smtClean="0">
-                <a:latin typeface="Arial" panose="020B0604020202020204" pitchFamily="34" charset="0"/>
-                <a:cs typeface="Arial" panose="020B0604020202020204" pitchFamily="34" charset="0"/>
-              </a:rPr>
-              <a:t>framework</a:t>
+              <a:t>earning can be captured in an RL framework</a:t>
             </a:r>
             <a:endParaRPr lang="en-US" sz="1600" dirty="0">
               <a:latin typeface="Arial" panose="020B0604020202020204" pitchFamily="34" charset="0"/>
@@ -13663,21 +13562,7 @@
                 <a:latin typeface="Arial" panose="020B0604020202020204" pitchFamily="34" charset="0"/>
                 <a:cs typeface="Arial" panose="020B0604020202020204" pitchFamily="34" charset="0"/>
               </a:rPr>
-              <a:t>P</a:t>
-            </a:r>
-            <a:r>
-              <a:rPr lang="en-US" sz="1600" dirty="0" smtClean="0">
-                <a:latin typeface="Arial" panose="020B0604020202020204" pitchFamily="34" charset="0"/>
-                <a:cs typeface="Arial" panose="020B0604020202020204" pitchFamily="34" charset="0"/>
-              </a:rPr>
-              <a:t>roposer </a:t>
-            </a:r>
-            <a:r>
-              <a:rPr lang="en-US" sz="1600" dirty="0" smtClean="0">
-                <a:latin typeface="Arial" panose="020B0604020202020204" pitchFamily="34" charset="0"/>
-                <a:cs typeface="Arial" panose="020B0604020202020204" pitchFamily="34" charset="0"/>
-              </a:rPr>
-              <a:t>learns the intercept of the acceptance function by trial-and-error</a:t>
+              <a:t>Proposer learns the intercept of the acceptance function by trial-and-error</a:t>
             </a:r>
           </a:p>
           <a:p>
@@ -13730,10 +13615,6 @@
               </a:rPr>
               <a:t>Subjects learn faster in the non-social condition due to reluctance to explore acceptance space out of adherence to fairness norm</a:t>
             </a:r>
-            <a:endParaRPr lang="en-US" sz="1600" dirty="0" smtClean="0">
-              <a:latin typeface="Arial" panose="020B0604020202020204" pitchFamily="34" charset="0"/>
-              <a:cs typeface="Arial" panose="020B0604020202020204" pitchFamily="34" charset="0"/>
-            </a:endParaRPr>
           </a:p>
           <a:p>
             <a:pPr marL="742950" lvl="1" indent="-285750" algn="just">
@@ -13752,47 +13633,22 @@
                 <a:latin typeface="Arial" panose="020B0604020202020204" pitchFamily="34" charset="0"/>
                 <a:cs typeface="Arial" panose="020B0604020202020204" pitchFamily="34" charset="0"/>
               </a:rPr>
-              <a:t>ore </a:t>
+              <a:t>ore asymmetric learning in social (learn more from rejection than acceptance, because of social “acceptability”) than in non-social, leading to sub-optimal behavior, (or perhaps the opposite - </a:t>
+            </a:r>
+            <a:r>
+              <a:rPr lang="en-US" sz="1600" dirty="0">
+                <a:latin typeface="Arial" panose="020B0604020202020204" pitchFamily="34" charset="0"/>
+                <a:cs typeface="Arial" panose="020B0604020202020204" pitchFamily="34" charset="0"/>
+              </a:rPr>
+              <a:t>m</a:t>
             </a:r>
             <a:r>
               <a:rPr lang="en-US" sz="1600" dirty="0" smtClean="0">
                 <a:latin typeface="Arial" panose="020B0604020202020204" pitchFamily="34" charset="0"/>
                 <a:cs typeface="Arial" panose="020B0604020202020204" pitchFamily="34" charset="0"/>
               </a:rPr>
-              <a:t>asymmetric learning in social (learn more from rejection than acceptance, because of social “acceptability”) than in non-social, leading to sub-optimal </a:t>
-            </a:r>
-            <a:r>
-              <a:rPr lang="en-US" sz="1600" dirty="0" smtClean="0">
-                <a:latin typeface="Arial" panose="020B0604020202020204" pitchFamily="34" charset="0"/>
-                <a:cs typeface="Arial" panose="020B0604020202020204" pitchFamily="34" charset="0"/>
-              </a:rPr>
-              <a:t>behavior, (o</a:t>
-            </a:r>
-            <a:r>
-              <a:rPr lang="en-US" sz="1600" dirty="0" smtClean="0">
-                <a:latin typeface="Arial" panose="020B0604020202020204" pitchFamily="34" charset="0"/>
-                <a:cs typeface="Arial" panose="020B0604020202020204" pitchFamily="34" charset="0"/>
-              </a:rPr>
-              <a:t>r perhaps the opposite - </a:t>
-            </a:r>
-            <a:r>
-              <a:rPr lang="en-US" sz="1600" dirty="0">
-                <a:latin typeface="Arial" panose="020B0604020202020204" pitchFamily="34" charset="0"/>
-                <a:cs typeface="Arial" panose="020B0604020202020204" pitchFamily="34" charset="0"/>
-              </a:rPr>
-              <a:t>m</a:t>
-            </a:r>
-            <a:r>
-              <a:rPr lang="en-US" sz="1600" dirty="0" smtClean="0">
-                <a:latin typeface="Arial" panose="020B0604020202020204" pitchFamily="34" charset="0"/>
-                <a:cs typeface="Arial" panose="020B0604020202020204" pitchFamily="34" charset="0"/>
-              </a:rPr>
               <a:t>ore responsive to victories in social condition?)</a:t>
             </a:r>
-            <a:endParaRPr lang="en-US" sz="1600" dirty="0" smtClean="0">
-              <a:latin typeface="Arial" panose="020B0604020202020204" pitchFamily="34" charset="0"/>
-              <a:cs typeface="Arial" panose="020B0604020202020204" pitchFamily="34" charset="0"/>
-            </a:endParaRPr>
           </a:p>
           <a:p>
             <a:pPr algn="just"/>
@@ -13839,11 +13695,25 @@
               <a:t>and </a:t>
             </a:r>
             <a:r>
+              <a:rPr lang="en-US" sz="1600" b="1" smtClean="0">
+                <a:latin typeface="Arial" panose="020B0604020202020204" pitchFamily="34" charset="0"/>
+                <a:cs typeface="Arial" panose="020B0604020202020204" pitchFamily="34" charset="0"/>
+              </a:rPr>
+              <a:t>both </a:t>
+            </a:r>
+            <a:r>
+              <a:rPr lang="en-US" sz="1600" b="1" smtClean="0">
+                <a:latin typeface="Arial" panose="020B0604020202020204" pitchFamily="34" charset="0"/>
+                <a:cs typeface="Arial" panose="020B0604020202020204" pitchFamily="34" charset="0"/>
+              </a:rPr>
+              <a:t>social-known </a:t>
+            </a:r>
+            <a:r>
               <a:rPr lang="en-US" sz="1600" b="1" dirty="0" smtClean="0">
                 <a:latin typeface="Arial" panose="020B0604020202020204" pitchFamily="34" charset="0"/>
                 <a:cs typeface="Arial" panose="020B0604020202020204" pitchFamily="34" charset="0"/>
               </a:rPr>
-              <a:t>both social-unknown and non-social conditions, the latter two of which do not differ</a:t>
+              <a:t>and non-social conditions, the latter two of which do not differ</a:t>
             </a:r>
             <a:r>
               <a:rPr lang="en-US" sz="1600" dirty="0" smtClean="0">
@@ -13852,10 +13722,6 @@
               </a:rPr>
               <a:t>:</a:t>
             </a:r>
-            <a:endParaRPr lang="en-US" sz="1600" dirty="0" smtClean="0">
-              <a:latin typeface="Arial" panose="020B0604020202020204" pitchFamily="34" charset="0"/>
-              <a:cs typeface="Arial" panose="020B0604020202020204" pitchFamily="34" charset="0"/>
-            </a:endParaRPr>
           </a:p>
           <a:p>
             <a:pPr marL="742950" lvl="1" indent="-285750" algn="just">
@@ -13895,21 +13761,7 @@
                 <a:latin typeface="Arial" panose="020B0604020202020204" pitchFamily="34" charset="0"/>
                 <a:cs typeface="Arial" panose="020B0604020202020204" pitchFamily="34" charset="0"/>
               </a:rPr>
-              <a:t>using </a:t>
-            </a:r>
-            <a:r>
-              <a:rPr lang="en-US" sz="1600" dirty="0" smtClean="0">
-                <a:latin typeface="Arial" panose="020B0604020202020204" pitchFamily="34" charset="0"/>
-                <a:cs typeface="Arial" panose="020B0604020202020204" pitchFamily="34" charset="0"/>
-              </a:rPr>
-              <a:t>the opacity of what constitutes fair as an excuse to eschew fairness and maximize </a:t>
-            </a:r>
-            <a:r>
-              <a:rPr lang="en-US" sz="1600" dirty="0" smtClean="0">
-                <a:latin typeface="Arial" panose="020B0604020202020204" pitchFamily="34" charset="0"/>
-                <a:cs typeface="Arial" panose="020B0604020202020204" pitchFamily="34" charset="0"/>
-              </a:rPr>
-              <a:t>profit, and explore the acceptance space in the same way as in the non-social condition</a:t>
+              <a:t>using the opacity of what constitutes fair as an excuse to eschew fairness and maximize profit, and explore the acceptance space in the same way as in the non-social condition</a:t>
             </a:r>
             <a:endParaRPr lang="en-US" sz="1600" dirty="0">
               <a:latin typeface="Arial" panose="020B0604020202020204" pitchFamily="34" charset="0"/>
@@ -14199,14 +14051,7 @@
                 <a:latin typeface="Arial" panose="020B0604020202020204" pitchFamily="34" charset="0"/>
                 <a:cs typeface="Arial" panose="020B0604020202020204" pitchFamily="34" charset="0"/>
               </a:rPr>
-              <a:t>There was no difference in model identifiability</a:t>
-            </a:r>
-            <a:r>
-              <a:rPr lang="en-US" sz="1600" dirty="0" smtClean="0">
-                <a:latin typeface="Arial" panose="020B0604020202020204" pitchFamily="34" charset="0"/>
-                <a:cs typeface="Arial" panose="020B0604020202020204" pitchFamily="34" charset="0"/>
-              </a:rPr>
-              <a:t>.</a:t>
+              <a:t>There was no difference in model identifiability.</a:t>
             </a:r>
           </a:p>
           <a:p>
@@ -14225,10 +14070,6 @@
               </a:rPr>
               <a:t>We also ran simulations for prior estimation and found little difference between 8, 10, and 12 repetitions of each division possibility. </a:t>
             </a:r>
-            <a:endParaRPr lang="en-US" sz="1600" dirty="0" smtClean="0">
-              <a:latin typeface="Arial" panose="020B0604020202020204" pitchFamily="34" charset="0"/>
-              <a:cs typeface="Arial" panose="020B0604020202020204" pitchFamily="34" charset="0"/>
-            </a:endParaRPr>
           </a:p>
         </p:txBody>
       </p:sp>
@@ -14376,8 +14217,8 @@
           <a:chExt cx="0" cy="0"/>
         </a:xfrm>
       </p:grpSpPr>
-      <mc:AlternateContent xmlns:mc="http://schemas.openxmlformats.org/markup-compatibility/2006">
-        <mc:Choice xmlns:a14="http://schemas.microsoft.com/office/drawing/2010/main" Requires="a14">
+      <mc:AlternateContent xmlns:mc="http://schemas.openxmlformats.org/markup-compatibility/2006" xmlns:a14="http://schemas.microsoft.com/office/drawing/2010/main">
+        <mc:Choice Requires="a14">
           <p:sp>
             <p:nvSpPr>
               <p:cNvPr id="71" name="Rectangle 70"/>
@@ -14790,21 +14631,7 @@
                     <a:latin typeface="Arial" panose="020B0604020202020204" pitchFamily="34" charset="0"/>
                     <a:cs typeface="Arial" panose="020B0604020202020204" pitchFamily="34" charset="0"/>
                   </a:rPr>
-                  <a:t> will accept (resistance </a:t>
-                </a:r>
-                <a:r>
-                  <a:rPr lang="en-US" sz="1600" dirty="0" smtClean="0">
-                    <a:latin typeface="Arial" panose="020B0604020202020204" pitchFamily="34" charset="0"/>
-                    <a:cs typeface="Arial" panose="020B0604020202020204" pitchFamily="34" charset="0"/>
-                  </a:rPr>
-                  <a:t>point), </a:t>
-                </a:r>
-                <a:r>
-                  <a:rPr lang="en-US" sz="1600" dirty="0" smtClean="0">
-                    <a:latin typeface="Arial" panose="020B0604020202020204" pitchFamily="34" charset="0"/>
-                    <a:cs typeface="Arial" panose="020B0604020202020204" pitchFamily="34" charset="0"/>
-                  </a:rPr>
-                  <a:t>even when these resistance points violate the </a:t>
+                  <a:t> will accept (resistance point), even when these resistance points violate the </a:t>
                 </a:r>
                 <a:r>
                   <a:rPr lang="en-US" sz="1600" b="1" dirty="0" smtClean="0">
@@ -14845,7 +14672,7 @@
             </p:txBody>
           </p:sp>
         </mc:Choice>
-        <mc:Fallback>
+        <mc:Fallback xmlns="">
           <p:sp>
             <p:nvSpPr>
               <p:cNvPr id="71" name="Rectangle 70"/>
@@ -15145,8 +14972,8 @@
           </p:txBody>
         </p:sp>
       </p:grpSp>
-      <mc:AlternateContent xmlns:mc="http://schemas.openxmlformats.org/markup-compatibility/2006">
-        <mc:Choice xmlns:a14="http://schemas.microsoft.com/office/drawing/2010/main" Requires="a14">
+      <mc:AlternateContent xmlns:mc="http://schemas.openxmlformats.org/markup-compatibility/2006" xmlns:a14="http://schemas.microsoft.com/office/drawing/2010/main">
+        <mc:Choice Requires="a14">
           <p:sp>
             <p:nvSpPr>
               <p:cNvPr id="82" name="TextBox 81"/>
@@ -15263,15 +15090,7 @@
                     <a:ea typeface="Arial" charset="0"/>
                     <a:cs typeface="Arial" charset="0"/>
                   </a:rPr>
-                  <a:t>is governed by two parameters, an intercept </a:t>
-                </a:r>
-                <a:r>
-                  <a:rPr lang="en-US" sz="1600" dirty="0">
-                    <a:latin typeface="Arial" charset="0"/>
-                    <a:ea typeface="Arial" charset="0"/>
-                    <a:cs typeface="Arial" charset="0"/>
-                  </a:rPr>
-                  <a:t>𝜷</a:t>
+                  <a:t>is governed by two parameters, an intercept 𝜷</a:t>
                 </a:r>
                 <a:r>
                   <a:rPr lang="en-US" sz="1600" baseline="-25000" dirty="0">
@@ -15287,15 +15106,7 @@
                     <a:ea typeface="Arial" charset="0"/>
                     <a:cs typeface="Arial" charset="0"/>
                   </a:rPr>
-                  <a:t> </a:t>
-                </a:r>
-                <a:r>
-                  <a:rPr lang="en-US" sz="1600" dirty="0" smtClean="0">
-                    <a:latin typeface="Arial" charset="0"/>
-                    <a:ea typeface="Arial" charset="0"/>
-                    <a:cs typeface="Arial" charset="0"/>
-                  </a:rPr>
-                  <a:t>and </a:t>
+                  <a:t> and </a:t>
                 </a:r>
                 <a:r>
                   <a:rPr lang="en-US" sz="1600" dirty="0">
@@ -15303,15 +15114,7 @@
                     <a:ea typeface="Arial" charset="0"/>
                     <a:cs typeface="Arial" charset="0"/>
                   </a:rPr>
-                  <a:t>a slope </a:t>
-                </a:r>
-                <a:r>
-                  <a:rPr lang="en-US" sz="1600" dirty="0">
-                    <a:latin typeface="Arial" charset="0"/>
-                    <a:ea typeface="Arial" charset="0"/>
-                    <a:cs typeface="Arial" charset="0"/>
-                  </a:rPr>
-                  <a:t>𝜷</a:t>
+                  <a:t>a slope 𝜷</a:t>
                 </a:r>
                 <a:r>
                   <a:rPr lang="en-US" sz="1600" baseline="-25000" dirty="0">
@@ -15360,7 +15163,7 @@
             </p:txBody>
           </p:sp>
         </mc:Choice>
-        <mc:Fallback>
+        <mc:Fallback xmlns="">
           <p:sp>
             <p:nvSpPr>
               <p:cNvPr id="82" name="TextBox 81"/>
@@ -15729,15 +15532,7 @@
                 <a:ea typeface="Arial" charset="0"/>
                 <a:cs typeface="Arial" charset="0"/>
               </a:rPr>
-              <a:t>will </a:t>
-            </a:r>
-            <a:r>
-              <a:rPr lang="en-US" sz="1600" dirty="0" smtClean="0">
-                <a:latin typeface="Arial" charset="0"/>
-                <a:ea typeface="Arial" charset="0"/>
-                <a:cs typeface="Arial" charset="0"/>
-              </a:rPr>
-              <a:t>be accepted: </a:t>
+              <a:t>will be accepted: </a:t>
             </a:r>
             <a:r>
               <a:rPr lang="en-US" sz="1600" dirty="0">
@@ -16166,23 +15961,7 @@
                 <a:ea typeface="Arial" charset="0"/>
                 <a:cs typeface="Arial" charset="0"/>
               </a:rPr>
-              <a:t> is accepted or </a:t>
-            </a:r>
-            <a:r>
-              <a:rPr lang="en-US" sz="1600" dirty="0" smtClean="0">
-                <a:latin typeface="Arial" charset="0"/>
-                <a:ea typeface="Arial" charset="0"/>
-                <a:cs typeface="Arial" charset="0"/>
-              </a:rPr>
-              <a:t>rejected</a:t>
-            </a:r>
-            <a:r>
-              <a:rPr lang="en-US" sz="1600" dirty="0" smtClean="0">
-                <a:latin typeface="Arial" charset="0"/>
-                <a:ea typeface="Arial" charset="0"/>
-                <a:cs typeface="Arial" charset="0"/>
-              </a:rPr>
-              <a:t>, </a:t>
+              <a:t> is accepted or rejected, </a:t>
             </a:r>
             <a:r>
               <a:rPr lang="en-US" sz="1600" dirty="0">
@@ -16677,8 +16456,8 @@
           <a:chExt cx="0" cy="0"/>
         </a:xfrm>
       </p:grpSpPr>
-      <mc:AlternateContent xmlns:mc="http://schemas.openxmlformats.org/markup-compatibility/2006">
-        <mc:Choice xmlns:a14="http://schemas.microsoft.com/office/drawing/2010/main" Requires="a14">
+      <mc:AlternateContent xmlns:mc="http://schemas.openxmlformats.org/markup-compatibility/2006" xmlns:a14="http://schemas.microsoft.com/office/drawing/2010/main">
+        <mc:Choice Requires="a14">
           <p:sp>
             <p:nvSpPr>
               <p:cNvPr id="4" name="Rectangle 3"/>
@@ -17339,7 +17118,7 @@
             </p:txBody>
           </p:sp>
         </mc:Choice>
-        <mc:Fallback>
+        <mc:Fallback xmlns="">
           <p:sp>
             <p:nvSpPr>
               <p:cNvPr id="4" name="Rectangle 3"/>
@@ -17509,15 +17288,7 @@
                 <a:ea typeface="Arial" charset="0"/>
                 <a:cs typeface="Arial" charset="0"/>
               </a:rPr>
-              <a:t>function. </a:t>
-            </a:r>
-            <a:r>
-              <a:rPr lang="en-US" sz="1600" dirty="0" smtClean="0">
-                <a:latin typeface="Arial" charset="0"/>
-                <a:ea typeface="Arial" charset="0"/>
-                <a:cs typeface="Arial" charset="0"/>
-              </a:rPr>
-              <a:t>For simplicity, we assume that 𝜷</a:t>
+              <a:t>function. For simplicity, we assume that 𝜷</a:t>
             </a:r>
             <a:r>
               <a:rPr lang="en-US" sz="1600" baseline="-25000" dirty="0" smtClean="0">
@@ -19276,15 +19047,7 @@
                 <a:ea typeface="Arial" charset="0"/>
                 <a:cs typeface="Arial" charset="0"/>
               </a:rPr>
-              <a:t>		</a:t>
-            </a:r>
-            <a:r>
-              <a:rPr lang="en-US" sz="1600" dirty="0" smtClean="0">
-                <a:latin typeface="Arial" charset="0"/>
-                <a:ea typeface="Arial" charset="0"/>
-                <a:cs typeface="Arial" charset="0"/>
-              </a:rPr>
-              <a:t>(8)</a:t>
+              <a:t>		(8)</a:t>
             </a:r>
             <a:endParaRPr lang="en-US" sz="1600" dirty="0">
               <a:latin typeface="Arial" charset="0"/>
@@ -20007,31 +19770,7 @@
                 <a:ea typeface="Arial" charset="0"/>
                 <a:cs typeface="Arial" charset="0"/>
               </a:rPr>
-              <a:t>In the known </a:t>
-            </a:r>
-            <a:r>
-              <a:rPr lang="en-US" sz="1600" dirty="0" smtClean="0">
-                <a:latin typeface="Arial" charset="0"/>
-                <a:ea typeface="Arial" charset="0"/>
-                <a:cs typeface="Arial" charset="0"/>
-              </a:rPr>
-              <a:t>condition, subjects </a:t>
-            </a:r>
-            <a:r>
-              <a:rPr lang="en-US" sz="1600" dirty="0" smtClean="0">
-                <a:latin typeface="Arial" charset="0"/>
-                <a:ea typeface="Arial" charset="0"/>
-                <a:cs typeface="Arial" charset="0"/>
-              </a:rPr>
-              <a:t>will be informed that they are playing against responders who have received different starting </a:t>
-            </a:r>
-            <a:r>
-              <a:rPr lang="en-US" sz="1600" dirty="0" smtClean="0">
-                <a:latin typeface="Arial" charset="0"/>
-                <a:ea typeface="Arial" charset="0"/>
-                <a:cs typeface="Arial" charset="0"/>
-              </a:rPr>
-              <a:t>endowments (social), and that the lotteries against which they are playing were generated from subject data in which responders started with different endowments (non-social). </a:t>
+              <a:t>In the known condition, subjects will be informed that they are playing against responders who have received different starting endowments (social), and that the lotteries against which they are playing were generated from subject data in which responders started with different endowments (non-social). </a:t>
             </a:r>
           </a:p>
           <a:p>
@@ -20277,69 +20016,8 @@
                 <a:ea typeface="Arial" charset="0"/>
                 <a:cs typeface="Arial" charset="0"/>
               </a:rPr>
-              <a:t>However</a:t>
-            </a:r>
-            <a:r>
-              <a:rPr lang="en-US" sz="1600" dirty="0" smtClean="0">
-                <a:latin typeface="Arial" charset="0"/>
-                <a:ea typeface="Arial" charset="0"/>
-                <a:cs typeface="Arial" charset="0"/>
-              </a:rPr>
-              <a:t>, in the </a:t>
-            </a:r>
-            <a:r>
-              <a:rPr lang="en-US" sz="1600" dirty="0" smtClean="0">
-                <a:latin typeface="Arial" charset="0"/>
-                <a:ea typeface="Arial" charset="0"/>
-                <a:cs typeface="Arial" charset="0"/>
-              </a:rPr>
-              <a:t>social-known </a:t>
-            </a:r>
-            <a:r>
-              <a:rPr lang="en-US" sz="1600" dirty="0" smtClean="0">
-                <a:latin typeface="Arial" charset="0"/>
-                <a:ea typeface="Arial" charset="0"/>
-                <a:cs typeface="Arial" charset="0"/>
-              </a:rPr>
-              <a:t>condition (where subjects know the reason for the different thresholds), subjects will be aware that the fairness norm </a:t>
-            </a:r>
-            <a:r>
-              <a:rPr lang="en-US" sz="1600" dirty="0" smtClean="0">
-                <a:latin typeface="Arial" charset="0"/>
-                <a:ea typeface="Arial" charset="0"/>
-                <a:cs typeface="Arial" charset="0"/>
-              </a:rPr>
-              <a:t>is not violated by low </a:t>
-            </a:r>
-            <a:r>
-              <a:rPr lang="en-US" sz="1600" dirty="0" smtClean="0">
-                <a:latin typeface="Arial" charset="0"/>
-                <a:ea typeface="Arial" charset="0"/>
-                <a:cs typeface="Arial" charset="0"/>
-              </a:rPr>
-              <a:t>offers, while in the </a:t>
-            </a:r>
-            <a:r>
-              <a:rPr lang="en-US" sz="1600" dirty="0" smtClean="0">
-                <a:latin typeface="Arial" charset="0"/>
-                <a:ea typeface="Arial" charset="0"/>
-                <a:cs typeface="Arial" charset="0"/>
-              </a:rPr>
-              <a:t>social-unknown </a:t>
-            </a:r>
-            <a:r>
-              <a:rPr lang="en-US" sz="1600" dirty="0" smtClean="0">
-                <a:latin typeface="Arial" charset="0"/>
-                <a:ea typeface="Arial" charset="0"/>
-                <a:cs typeface="Arial" charset="0"/>
-              </a:rPr>
-              <a:t>condition this fact is never made explicit. </a:t>
-            </a:r>
-            <a:endParaRPr lang="en-US" sz="1600" dirty="0" smtClean="0">
-              <a:latin typeface="Arial" charset="0"/>
-              <a:ea typeface="Arial" charset="0"/>
-              <a:cs typeface="Arial" charset="0"/>
-            </a:endParaRPr>
+              <a:t>However, in the social-known condition (where subjects know the reason for the different thresholds), subjects will be aware that the fairness norm is not violated by low offers, while in the social-unknown condition this fact is never made explicit. </a:t>
+            </a:r>
           </a:p>
           <a:p>
             <a:pPr>
@@ -20365,7 +20043,15 @@
                 <a:ea typeface="Arial" charset="0"/>
                 <a:cs typeface="Arial" charset="0"/>
               </a:rPr>
-              <a:t>Therefore</a:t>
+              <a:t>Therefore, in the social-known condition, subjects could explore the full acceptance range in an attempt either to (</a:t>
+            </a:r>
+            <a:r>
+              <a:rPr lang="en-US" sz="1600" dirty="0" err="1" smtClean="0">
+                <a:latin typeface="Arial" charset="0"/>
+                <a:ea typeface="Arial" charset="0"/>
+                <a:cs typeface="Arial" charset="0"/>
+              </a:rPr>
+              <a:t>i</a:t>
             </a:r>
             <a:r>
               <a:rPr lang="en-US" sz="1600" dirty="0" smtClean="0">
@@ -20373,7 +20059,15 @@
                 <a:ea typeface="Arial" charset="0"/>
                 <a:cs typeface="Arial" charset="0"/>
               </a:rPr>
-              <a:t>, in the </a:t>
+              <a:t>) learn what behavior is fair </a:t>
+            </a:r>
+            <a:r>
+              <a:rPr lang="en-US" sz="1600" i="1" dirty="0" smtClean="0">
+                <a:latin typeface="Arial" charset="0"/>
+                <a:ea typeface="Arial" charset="0"/>
+                <a:cs typeface="Arial" charset="0"/>
+              </a:rPr>
+              <a:t>or</a:t>
             </a:r>
             <a:r>
               <a:rPr lang="en-US" sz="1600" dirty="0" smtClean="0">
@@ -20381,79 +20075,7 @@
                 <a:ea typeface="Arial" charset="0"/>
                 <a:cs typeface="Arial" charset="0"/>
               </a:rPr>
-              <a:t>social-known </a:t>
-            </a:r>
-            <a:r>
-              <a:rPr lang="en-US" sz="1600" dirty="0" smtClean="0">
-                <a:latin typeface="Arial" charset="0"/>
-                <a:ea typeface="Arial" charset="0"/>
-                <a:cs typeface="Arial" charset="0"/>
-              </a:rPr>
-              <a:t>condition, subjects could explore the full acceptance range in an attempt either </a:t>
-            </a:r>
-            <a:r>
-              <a:rPr lang="en-US" sz="1600" dirty="0" smtClean="0">
-                <a:latin typeface="Arial" charset="0"/>
-                <a:ea typeface="Arial" charset="0"/>
-                <a:cs typeface="Arial" charset="0"/>
-              </a:rPr>
-              <a:t>to (</a:t>
-            </a:r>
-            <a:r>
-              <a:rPr lang="en-US" sz="1600" dirty="0" err="1" smtClean="0">
-                <a:latin typeface="Arial" charset="0"/>
-                <a:ea typeface="Arial" charset="0"/>
-                <a:cs typeface="Arial" charset="0"/>
-              </a:rPr>
-              <a:t>i</a:t>
-            </a:r>
-            <a:r>
-              <a:rPr lang="en-US" sz="1600" dirty="0" smtClean="0">
-                <a:latin typeface="Arial" charset="0"/>
-                <a:ea typeface="Arial" charset="0"/>
-                <a:cs typeface="Arial" charset="0"/>
-              </a:rPr>
-              <a:t>) </a:t>
-            </a:r>
-            <a:r>
-              <a:rPr lang="en-US" sz="1600" dirty="0" smtClean="0">
-                <a:latin typeface="Arial" charset="0"/>
-                <a:ea typeface="Arial" charset="0"/>
-                <a:cs typeface="Arial" charset="0"/>
-              </a:rPr>
-              <a:t>learn what behavior is fair </a:t>
-            </a:r>
-            <a:r>
-              <a:rPr lang="en-US" sz="1600" i="1" dirty="0" smtClean="0">
-                <a:latin typeface="Arial" charset="0"/>
-                <a:ea typeface="Arial" charset="0"/>
-                <a:cs typeface="Arial" charset="0"/>
-              </a:rPr>
-              <a:t>or</a:t>
-            </a:r>
-            <a:r>
-              <a:rPr lang="en-US" sz="1600" dirty="0" smtClean="0">
-                <a:latin typeface="Arial" charset="0"/>
-                <a:ea typeface="Arial" charset="0"/>
-                <a:cs typeface="Arial" charset="0"/>
-              </a:rPr>
-              <a:t> </a:t>
-            </a:r>
-            <a:r>
-              <a:rPr lang="en-US" sz="1600" dirty="0" smtClean="0">
-                <a:latin typeface="Arial" charset="0"/>
-                <a:ea typeface="Arial" charset="0"/>
-                <a:cs typeface="Arial" charset="0"/>
-              </a:rPr>
-              <a:t>(ii) to </a:t>
-            </a:r>
-            <a:r>
-              <a:rPr lang="en-US" sz="1600" dirty="0" smtClean="0">
-                <a:latin typeface="Arial" charset="0"/>
-                <a:ea typeface="Arial" charset="0"/>
-                <a:cs typeface="Arial" charset="0"/>
-              </a:rPr>
-              <a:t>maximize profit. </a:t>
+              <a:t> (ii) to maximize profit. </a:t>
             </a:r>
           </a:p>
           <a:p>

</xml_diff>